<commit_message>
feat(5_handwriting_by_linear_layer): update ppt and code
</commit_message>
<xml_diff>
--- a/lessons/5_handwriting_by_linear_layer/ppt/用全连接层识别手写数字.pptx
+++ b/lessons/5_handwriting_by_linear_layer/ppt/用全连接层识别手写数字.pptx
@@ -5,10 +5,10 @@
     <p:sldMasterId id="2147483648" r:id="rId1"/>
   </p:sldMasterIdLst>
   <p:notesMasterIdLst>
-    <p:notesMasterId r:id="rId35"/>
+    <p:notesMasterId r:id="rId36"/>
   </p:notesMasterIdLst>
   <p:handoutMasterIdLst>
-    <p:handoutMasterId r:id="rId36"/>
+    <p:handoutMasterId r:id="rId37"/>
   </p:handoutMasterIdLst>
   <p:sldIdLst>
     <p:sldId id="307" r:id="rId2"/>
@@ -29,26 +29,27 @@
     <p:sldId id="1069" r:id="rId17"/>
     <p:sldId id="1078" r:id="rId18"/>
     <p:sldId id="1083" r:id="rId19"/>
-    <p:sldId id="1084" r:id="rId20"/>
-    <p:sldId id="1085" r:id="rId21"/>
-    <p:sldId id="1086" r:id="rId22"/>
-    <p:sldId id="1071" r:id="rId23"/>
-    <p:sldId id="1077" r:id="rId24"/>
-    <p:sldId id="1070" r:id="rId25"/>
-    <p:sldId id="1079" r:id="rId26"/>
-    <p:sldId id="1087" r:id="rId27"/>
-    <p:sldId id="537" r:id="rId28"/>
-    <p:sldId id="536" r:id="rId29"/>
-    <p:sldId id="1014" r:id="rId30"/>
-    <p:sldId id="1013" r:id="rId31"/>
-    <p:sldId id="997" r:id="rId32"/>
-    <p:sldId id="998" r:id="rId33"/>
-    <p:sldId id="653" r:id="rId34"/>
+    <p:sldId id="1085" r:id="rId20"/>
+    <p:sldId id="1086" r:id="rId21"/>
+    <p:sldId id="1089" r:id="rId22"/>
+    <p:sldId id="1088" r:id="rId23"/>
+    <p:sldId id="1071" r:id="rId24"/>
+    <p:sldId id="1077" r:id="rId25"/>
+    <p:sldId id="1070" r:id="rId26"/>
+    <p:sldId id="1079" r:id="rId27"/>
+    <p:sldId id="1087" r:id="rId28"/>
+    <p:sldId id="537" r:id="rId29"/>
+    <p:sldId id="536" r:id="rId30"/>
+    <p:sldId id="1014" r:id="rId31"/>
+    <p:sldId id="1013" r:id="rId32"/>
+    <p:sldId id="997" r:id="rId33"/>
+    <p:sldId id="998" r:id="rId34"/>
+    <p:sldId id="653" r:id="rId35"/>
   </p:sldIdLst>
   <p:sldSz cx="12192000" cy="6858000"/>
   <p:notesSz cx="6858000" cy="9144000"/>
   <p:custDataLst>
-    <p:tags r:id="rId37"/>
+    <p:tags r:id="rId38"/>
   </p:custDataLst>
   <p:defaultTextStyle>
     <a:defPPr>
@@ -241,7 +242,7 @@
                 <a:latin typeface="微软雅黑" panose="020B0503020204020204" charset="-122"/>
                 <a:ea typeface="微软雅黑" panose="020B0503020204020204" charset="-122"/>
               </a:rPr>
-              <a:t>2022/11/17</a:t>
+              <a:t>2022/11/18</a:t>
             </a:fld>
             <a:endParaRPr lang="zh-CN" altLang="en-US">
               <a:latin typeface="微软雅黑" panose="020B0503020204020204" charset="-122"/>
@@ -424,7 +425,7 @@
           <a:p>
             <a:fld id="{1AC49D05-6128-4D0D-A32A-06A5E73B386C}" type="datetimeFigureOut">
               <a:rPr lang="zh-CN" altLang="en-US" smtClean="0"/>
-              <a:t>2022/11/17</a:t>
+              <a:t>2022/11/18</a:t>
             </a:fld>
             <a:endParaRPr lang="zh-CN" altLang="en-US"/>
           </a:p>
@@ -1086,7 +1087,7 @@
           <a:p>
             <a:fld id="{9EFD9D74-47D9-4702-A33C-335B63B48DBF}" type="datetimeFigureOut">
               <a:rPr lang="zh-CN" altLang="en-US" smtClean="0"/>
-              <a:t>2022/11/17</a:t>
+              <a:t>2022/11/18</a:t>
             </a:fld>
             <a:endParaRPr lang="zh-CN" altLang="en-US" dirty="0"/>
           </a:p>
@@ -1419,7 +1420,7 @@
           <a:p>
             <a:fld id="{760FBDFE-C587-4B4C-A407-44438C67B59E}" type="datetimeFigureOut">
               <a:rPr lang="zh-CN" altLang="en-US" smtClean="0"/>
-              <a:t>2022/11/17</a:t>
+              <a:t>2022/11/18</a:t>
             </a:fld>
             <a:endParaRPr lang="zh-CN" altLang="en-US"/>
           </a:p>
@@ -1592,7 +1593,7 @@
           <a:p>
             <a:fld id="{9EFD9D74-47D9-4702-A33C-335B63B48DBF}" type="datetimeFigureOut">
               <a:rPr lang="zh-CN" altLang="en-US" smtClean="0"/>
-              <a:t>2022/11/17</a:t>
+              <a:t>2022/11/18</a:t>
             </a:fld>
             <a:endParaRPr lang="zh-CN" altLang="en-US" dirty="0"/>
           </a:p>
@@ -2117,7 +2118,7 @@
           <a:p>
             <a:fld id="{760FBDFE-C587-4B4C-A407-44438C67B59E}" type="datetimeFigureOut">
               <a:rPr lang="zh-CN" altLang="en-US" smtClean="0"/>
-              <a:t>2022/11/17</a:t>
+              <a:t>2022/11/18</a:t>
             </a:fld>
             <a:endParaRPr lang="zh-CN" altLang="en-US"/>
           </a:p>
@@ -2865,7 +2866,7 @@
           <a:p>
             <a:fld id="{760FBDFE-C587-4B4C-A407-44438C67B59E}" type="datetimeFigureOut">
               <a:rPr lang="zh-CN" altLang="en-US" smtClean="0"/>
-              <a:t>2022/11/17</a:t>
+              <a:t>2022/11/18</a:t>
             </a:fld>
             <a:endParaRPr lang="zh-CN" altLang="en-US"/>
           </a:p>
@@ -3031,7 +3032,7 @@
           <a:p>
             <a:fld id="{760FBDFE-C587-4B4C-A407-44438C67B59E}" type="datetimeFigureOut">
               <a:rPr lang="zh-CN" altLang="en-US" smtClean="0"/>
-              <a:t>2022/11/17</a:t>
+              <a:t>2022/11/18</a:t>
             </a:fld>
             <a:endParaRPr lang="zh-CN" altLang="en-US"/>
           </a:p>
@@ -3145,7 +3146,7 @@
           <a:p>
             <a:fld id="{760FBDFE-C587-4B4C-A407-44438C67B59E}" type="datetimeFigureOut">
               <a:rPr lang="zh-CN" altLang="en-US" smtClean="0"/>
-              <a:t>2022/11/17</a:t>
+              <a:t>2022/11/18</a:t>
             </a:fld>
             <a:endParaRPr lang="zh-CN" altLang="en-US"/>
           </a:p>
@@ -3475,7 +3476,7 @@
           <a:p>
             <a:fld id="{9EFD9D74-47D9-4702-A33C-335B63B48DBF}" type="datetimeFigureOut">
               <a:rPr lang="zh-CN" altLang="en-US" smtClean="0"/>
-              <a:t>2022/11/17</a:t>
+              <a:t>2022/11/18</a:t>
             </a:fld>
             <a:endParaRPr lang="zh-CN" altLang="en-US" dirty="0"/>
           </a:p>
@@ -3988,7 +3989,7 @@
           <a:p>
             <a:fld id="{760FBDFE-C587-4B4C-A407-44438C67B59E}" type="datetimeFigureOut">
               <a:rPr lang="zh-CN" altLang="en-US" smtClean="0"/>
-              <a:t>2022/11/17</a:t>
+              <a:t>2022/11/18</a:t>
             </a:fld>
             <a:endParaRPr lang="zh-CN" altLang="en-US"/>
           </a:p>
@@ -4102,7 +4103,7 @@
           <a:p>
             <a:fld id="{760FBDFE-C587-4B4C-A407-44438C67B59E}" type="datetimeFigureOut">
               <a:rPr lang="zh-CN" altLang="en-US" smtClean="0"/>
-              <a:t>2022/11/17</a:t>
+              <a:t>2022/11/18</a:t>
             </a:fld>
             <a:endParaRPr lang="zh-CN" altLang="en-US"/>
           </a:p>
@@ -4390,7 +4391,7 @@
           <a:p>
             <a:fld id="{82F288E0-7875-42C4-84C8-98DBBD3BF4D2}" type="datetimeFigureOut">
               <a:rPr lang="zh-CN" altLang="en-US" smtClean="0"/>
-              <a:t>2022/11/17</a:t>
+              <a:t>2022/11/18</a:t>
             </a:fld>
             <a:endParaRPr lang="zh-CN" altLang="en-US"/>
           </a:p>
@@ -4849,7 +4850,7 @@
           <a:p>
             <a:fld id="{760FBDFE-C587-4B4C-A407-44438C67B59E}" type="datetimeFigureOut">
               <a:rPr lang="zh-CN" altLang="en-US" smtClean="0"/>
-              <a:t>2022/11/17</a:t>
+              <a:t>2022/11/18</a:t>
             </a:fld>
             <a:endParaRPr lang="zh-CN" altLang="en-US"/>
           </a:p>
@@ -5518,7 +5519,7 @@
           <a:p>
             <a:fld id="{9EFD9D74-47D9-4702-A33C-335B63B48DBF}" type="datetimeFigureOut">
               <a:rPr lang="zh-CN" altLang="en-US" smtClean="0"/>
-              <a:t>2022/11/17</a:t>
+              <a:t>2022/11/18</a:t>
             </a:fld>
             <a:endParaRPr lang="zh-CN" altLang="en-US" dirty="0"/>
           </a:p>
@@ -5666,7 +5667,7 @@
           <a:p>
             <a:fld id="{9EFD9D74-47D9-4702-A33C-335B63B48DBF}" type="datetimeFigureOut">
               <a:rPr lang="zh-CN" altLang="en-US" smtClean="0"/>
-              <a:t>2022/11/17</a:t>
+              <a:t>2022/11/18</a:t>
             </a:fld>
             <a:endParaRPr lang="zh-CN" altLang="en-US" dirty="0"/>
           </a:p>
@@ -9407,7 +9408,7 @@
             </a:pPr>
             <a:r>
               <a:rPr lang="zh-CN" altLang="en-US" dirty="0"/>
-              <a:t>如何调试？</a:t>
+              <a:t>如何找到未收敛的原因？</a:t>
             </a:r>
             <a:endParaRPr lang="en-US" altLang="zh-CN" dirty="0"/>
           </a:p>
@@ -9418,15 +9419,7 @@
             </a:pPr>
             <a:r>
               <a:rPr lang="zh-CN" altLang="en-US" dirty="0"/>
-              <a:t>应该在哪些地方</a:t>
-            </a:r>
-            <a:r>
-              <a:rPr lang="en-US" altLang="zh-CN" dirty="0"/>
-              <a:t>log</a:t>
-            </a:r>
-            <a:r>
-              <a:rPr lang="zh-CN" altLang="en-US" dirty="0"/>
-              <a:t>？</a:t>
+              <a:t>打印哪些值？</a:t>
             </a:r>
             <a:endParaRPr lang="en-US" altLang="zh-CN" dirty="0"/>
           </a:p>
@@ -9527,7 +9520,7 @@
         <p:spPr>
           <a:xfrm>
             <a:off x="6430946" y="1748567"/>
-            <a:ext cx="2262158" cy="369332"/>
+            <a:ext cx="4403770" cy="369332"/>
           </a:xfrm>
           <a:prstGeom prst="rect">
             <a:avLst/>
@@ -9550,7 +9543,68 @@
             </a:r>
             <a:r>
               <a:rPr kumimoji="1" lang="zh-CN" altLang="en-US" dirty="0"/>
-              <a:t>来调试</a:t>
+              <a:t>来调试，打印一些重要的值</a:t>
+            </a:r>
+          </a:p>
+        </p:txBody>
+      </p:sp>
+      <p:sp>
+        <p:nvSpPr>
+          <p:cNvPr id="4" name="文本框 3">
+            <a:extLst>
+              <a:ext uri="{FF2B5EF4-FFF2-40B4-BE49-F238E27FC236}">
+                <a16:creationId xmlns:a16="http://schemas.microsoft.com/office/drawing/2014/main" id="{1390A33F-F179-195A-20D9-5DE2779630D5}"/>
+              </a:ext>
+            </a:extLst>
+          </p:cNvPr>
+          <p:cNvSpPr txBox="1"/>
+          <p:nvPr/>
+        </p:nvSpPr>
+        <p:spPr>
+          <a:xfrm>
+            <a:off x="4859096" y="2473380"/>
+            <a:ext cx="3933211" cy="923330"/>
+          </a:xfrm>
+          <a:prstGeom prst="rect">
+            <a:avLst/>
+          </a:prstGeom>
+          <a:noFill/>
+        </p:spPr>
+        <p:txBody>
+          <a:bodyPr wrap="square" rtlCol="0">
+            <a:spAutoFit/>
+          </a:bodyPr>
+          <a:lstStyle/>
+          <a:p>
+            <a:pPr marL="285750" indent="-285750">
+              <a:buFont typeface="Arial" panose="020B0604020202020204" pitchFamily="34" charset="0"/>
+              <a:buChar char="•"/>
+            </a:pPr>
+            <a:r>
+              <a:rPr kumimoji="1" lang="zh-CN" altLang="en-US" dirty="0"/>
+              <a:t>前向传播的输入输出</a:t>
+            </a:r>
+            <a:endParaRPr kumimoji="1" lang="en-US" altLang="zh-CN" dirty="0"/>
+          </a:p>
+          <a:p>
+            <a:pPr marL="285750" indent="-285750">
+              <a:buFont typeface="Arial" panose="020B0604020202020204" pitchFamily="34" charset="0"/>
+              <a:buChar char="•"/>
+            </a:pPr>
+            <a:r>
+              <a:rPr kumimoji="1" lang="zh-CN" altLang="en-US" dirty="0"/>
+              <a:t>后向传播的输入输出</a:t>
+            </a:r>
+            <a:endParaRPr kumimoji="1" lang="en-US" altLang="zh-CN" dirty="0"/>
+          </a:p>
+          <a:p>
+            <a:pPr marL="285750" indent="-285750">
+              <a:buFont typeface="Arial" panose="020B0604020202020204" pitchFamily="34" charset="0"/>
+              <a:buChar char="•"/>
+            </a:pPr>
+            <a:r>
+              <a:rPr kumimoji="1" lang="zh-CN" altLang="en-US" dirty="0"/>
+              <a:t>更新后的权重矩阵</a:t>
             </a:r>
           </a:p>
         </p:txBody>
@@ -9589,7 +9643,7 @@
                             </p:stCondLst>
                             <p:childTnLst>
                               <p:par>
-                                <p:cTn id="5" presetID="1" presetClass="entr" presetSubtype="0" fill="hold" grpId="0" nodeType="clickEffect">
+                                <p:cTn id="5" presetID="1" presetClass="entr" presetSubtype="0" fill="hold" nodeType="clickEffect">
                                   <p:stCondLst>
                                     <p:cond delay="0"/>
                                   </p:stCondLst>
@@ -9602,7 +9656,150 @@
                                           </p:stCondLst>
                                         </p:cTn>
                                         <p:tgtEl>
-                                          <p:spTgt spid="6"/>
+                                          <p:spTgt spid="6">
+                                            <p:txEl>
+                                              <p:pRg st="0" end="0"/>
+                                            </p:txEl>
+                                          </p:spTgt>
+                                        </p:tgtEl>
+                                        <p:attrNameLst>
+                                          <p:attrName>style.visibility</p:attrName>
+                                        </p:attrNameLst>
+                                      </p:cBhvr>
+                                      <p:to>
+                                        <p:strVal val="visible"/>
+                                      </p:to>
+                                    </p:set>
+                                  </p:childTnLst>
+                                </p:cTn>
+                              </p:par>
+                            </p:childTnLst>
+                          </p:cTn>
+                        </p:par>
+                      </p:childTnLst>
+                    </p:cTn>
+                  </p:par>
+                  <p:par>
+                    <p:cTn id="7" fill="hold">
+                      <p:stCondLst>
+                        <p:cond delay="indefinite"/>
+                      </p:stCondLst>
+                      <p:childTnLst>
+                        <p:par>
+                          <p:cTn id="8" fill="hold">
+                            <p:stCondLst>
+                              <p:cond delay="0"/>
+                            </p:stCondLst>
+                            <p:childTnLst>
+                              <p:par>
+                                <p:cTn id="9" presetID="1" presetClass="entr" presetSubtype="0" fill="hold" grpId="0" nodeType="clickEffect">
+                                  <p:stCondLst>
+                                    <p:cond delay="0"/>
+                                  </p:stCondLst>
+                                  <p:childTnLst>
+                                    <p:set>
+                                      <p:cBhvr>
+                                        <p:cTn id="10" dur="1" fill="hold">
+                                          <p:stCondLst>
+                                            <p:cond delay="0"/>
+                                          </p:stCondLst>
+                                        </p:cTn>
+                                        <p:tgtEl>
+                                          <p:spTgt spid="2"/>
+                                        </p:tgtEl>
+                                        <p:attrNameLst>
+                                          <p:attrName>style.visibility</p:attrName>
+                                        </p:attrNameLst>
+                                      </p:cBhvr>
+                                      <p:to>
+                                        <p:strVal val="visible"/>
+                                      </p:to>
+                                    </p:set>
+                                  </p:childTnLst>
+                                </p:cTn>
+                              </p:par>
+                            </p:childTnLst>
+                          </p:cTn>
+                        </p:par>
+                      </p:childTnLst>
+                    </p:cTn>
+                  </p:par>
+                  <p:par>
+                    <p:cTn id="11" fill="hold">
+                      <p:stCondLst>
+                        <p:cond delay="indefinite"/>
+                      </p:stCondLst>
+                      <p:childTnLst>
+                        <p:par>
+                          <p:cTn id="12" fill="hold">
+                            <p:stCondLst>
+                              <p:cond delay="0"/>
+                            </p:stCondLst>
+                            <p:childTnLst>
+                              <p:par>
+                                <p:cTn id="13" presetID="1" presetClass="entr" presetSubtype="0" fill="hold" nodeType="clickEffect">
+                                  <p:stCondLst>
+                                    <p:cond delay="0"/>
+                                  </p:stCondLst>
+                                  <p:childTnLst>
+                                    <p:set>
+                                      <p:cBhvr>
+                                        <p:cTn id="14" dur="1" fill="hold">
+                                          <p:stCondLst>
+                                            <p:cond delay="0"/>
+                                          </p:stCondLst>
+                                        </p:cTn>
+                                        <p:tgtEl>
+                                          <p:spTgt spid="6">
+                                            <p:txEl>
+                                              <p:pRg st="1" end="1"/>
+                                            </p:txEl>
+                                          </p:spTgt>
+                                        </p:tgtEl>
+                                        <p:attrNameLst>
+                                          <p:attrName>style.visibility</p:attrName>
+                                        </p:attrNameLst>
+                                      </p:cBhvr>
+                                      <p:to>
+                                        <p:strVal val="visible"/>
+                                      </p:to>
+                                    </p:set>
+                                  </p:childTnLst>
+                                </p:cTn>
+                              </p:par>
+                            </p:childTnLst>
+                          </p:cTn>
+                        </p:par>
+                      </p:childTnLst>
+                    </p:cTn>
+                  </p:par>
+                  <p:par>
+                    <p:cTn id="15" fill="hold">
+                      <p:stCondLst>
+                        <p:cond delay="indefinite"/>
+                      </p:stCondLst>
+                      <p:childTnLst>
+                        <p:par>
+                          <p:cTn id="16" fill="hold">
+                            <p:stCondLst>
+                              <p:cond delay="0"/>
+                            </p:stCondLst>
+                            <p:childTnLst>
+                              <p:par>
+                                <p:cTn id="17" presetID="1" presetClass="entr" presetSubtype="0" fill="hold" grpId="0" nodeType="clickEffect">
+                                  <p:stCondLst>
+                                    <p:cond delay="0"/>
+                                  </p:stCondLst>
+                                  <p:childTnLst>
+                                    <p:set>
+                                      <p:cBhvr>
+                                        <p:cTn id="18" dur="1" fill="hold">
+                                          <p:stCondLst>
+                                            <p:cond delay="0"/>
+                                          </p:stCondLst>
+                                        </p:cTn>
+                                        <p:tgtEl>
+                                          <p:spTgt spid="4"/>
                                         </p:tgtEl>
                                         <p:attrNameLst>
                                           <p:attrName>style.visibility</p:attrName>
@@ -9643,7 +9840,8 @@
       </p:par>
     </p:tnLst>
     <p:bldLst>
-      <p:bldP spid="6" grpId="0"/>
+      <p:bldP spid="2" grpId="0"/>
+      <p:bldP spid="4" grpId="0"/>
     </p:bldLst>
   </p:timing>
 </p:sld>
@@ -9685,7 +9883,7 @@
               <a:rPr lang="zh-CN" altLang="en-US" dirty="0">
                 <a:sym typeface="+mn-ea"/>
               </a:rPr>
-              <a:t>任务：找到未收敛的原因</a:t>
+              <a:t>任务：找到未收敛的原因并修复</a:t>
             </a:r>
             <a:endParaRPr dirty="0">
               <a:sym typeface="+mn-ea"/>
@@ -9928,22 +10126,40 @@
             </a:pPr>
             <a:r>
               <a:rPr lang="zh-CN" altLang="en-US" dirty="0"/>
-              <a:t>请通过打印的方法调试，找到原因</a:t>
-            </a:r>
-            <a:br>
-              <a:rPr lang="en-US" altLang="zh-CN" dirty="0"/>
-            </a:br>
-            <a:r>
-              <a:rPr lang="en-US" altLang="zh-CN" dirty="0"/>
-              <a:t>TODO </a:t>
-            </a:r>
+              <a:t>请通过打印的方法调试，找到异常的数据？</a:t>
+            </a:r>
+            <a:endParaRPr lang="en-US" altLang="zh-CN" dirty="0"/>
+          </a:p>
+          <a:p>
+            <a:pPr marL="285750" indent="-285750">
+              <a:buFont typeface="Arial" panose="020B0604020202020204" pitchFamily="34" charset="0"/>
+              <a:buChar char="•"/>
+            </a:pPr>
             <a:r>
               <a:rPr lang="zh-CN" altLang="en-US" dirty="0"/>
-              <a:t>给出</a:t>
-            </a:r>
-            <a:r>
-              <a:rPr lang="en-US" altLang="zh-CN" dirty="0" err="1"/>
-              <a:t>Log.res</a:t>
+              <a:t>原因是什么？如何修复？</a:t>
+            </a:r>
+            <a:endParaRPr lang="en-US" altLang="zh-CN" dirty="0"/>
+          </a:p>
+          <a:p>
+            <a:pPr marL="285750" indent="-285750">
+              <a:buFont typeface="Arial" panose="020B0604020202020204" pitchFamily="34" charset="0"/>
+              <a:buChar char="•"/>
+            </a:pPr>
+            <a:r>
+              <a:rPr lang="zh-CN" altLang="en-US" dirty="0"/>
+              <a:t>请实现修复</a:t>
+            </a:r>
+            <a:endParaRPr lang="en-US" altLang="zh-CN" dirty="0"/>
+          </a:p>
+          <a:p>
+            <a:pPr marL="285750" indent="-285750">
+              <a:buFont typeface="Arial" panose="020B0604020202020204" pitchFamily="34" charset="0"/>
+              <a:buChar char="•"/>
+            </a:pPr>
+            <a:r>
+              <a:rPr lang="zh-CN" altLang="en-US" dirty="0"/>
+              <a:t>请每个同学都运行修复后的代码，看下是否收敛？</a:t>
             </a:r>
             <a:endParaRPr lang="en-US" altLang="zh-CN" dirty="0"/>
           </a:p>
@@ -10025,6 +10241,200 @@
           </a:p>
         </p:txBody>
       </p:sp>
+      <mc:AlternateContent xmlns:mc="http://schemas.openxmlformats.org/markup-compatibility/2006">
+        <mc:Choice xmlns:a14="http://schemas.microsoft.com/office/drawing/2010/main" Requires="a14">
+          <p:sp>
+            <p:nvSpPr>
+              <p:cNvPr id="2" name="文本框 1">
+                <a:extLst>
+                  <a:ext uri="{FF2B5EF4-FFF2-40B4-BE49-F238E27FC236}">
+                    <a16:creationId xmlns:a16="http://schemas.microsoft.com/office/drawing/2014/main" id="{9E9BD0BD-7653-0A88-0432-4DCCF71865B1}"/>
+                  </a:ext>
+                </a:extLst>
+              </p:cNvPr>
+              <p:cNvSpPr txBox="1"/>
+              <p:nvPr/>
+            </p:nvSpPr>
+            <p:spPr>
+              <a:xfrm>
+                <a:off x="1868992" y="4642318"/>
+                <a:ext cx="10190935" cy="1357423"/>
+              </a:xfrm>
+              <a:prstGeom prst="rect">
+                <a:avLst/>
+              </a:prstGeom>
+              <a:noFill/>
+            </p:spPr>
+            <p:txBody>
+              <a:bodyPr wrap="square" rtlCol="0">
+                <a:spAutoFit/>
+              </a:bodyPr>
+              <a:lstStyle/>
+              <a:p>
+                <a:pPr marL="285750" indent="-285750">
+                  <a:buFont typeface="Arial" panose="020B0604020202020204" pitchFamily="34" charset="0"/>
+                  <a:buChar char="•"/>
+                </a:pPr>
+                <a:r>
+                  <a:rPr kumimoji="1" lang="zh-CN" altLang="en-US" dirty="0"/>
+                  <a:t>增大学习率</a:t>
+                </a:r>
+                <a:endParaRPr kumimoji="1" lang="en-US" altLang="zh-CN" dirty="0"/>
+              </a:p>
+              <a:p>
+                <a:pPr marL="285750" indent="-285750">
+                  <a:buFont typeface="Arial" panose="020B0604020202020204" pitchFamily="34" charset="0"/>
+                  <a:buChar char="•"/>
+                </a:pPr>
+                <a:r>
+                  <a:rPr kumimoji="1" lang="zh-CN" altLang="en-US" dirty="0"/>
+                  <a:t>避免加权和过大</a:t>
+                </a:r>
+                <a:endParaRPr kumimoji="1" lang="en-US" altLang="zh-CN" dirty="0"/>
+              </a:p>
+              <a:p>
+                <a:pPr marL="285750" indent="-285750">
+                  <a:buFont typeface="Arial" panose="020B0604020202020204" pitchFamily="34" charset="0"/>
+                  <a:buChar char="•"/>
+                </a:pPr>
+                <a:r>
+                  <a:rPr kumimoji="1" lang="zh-CN" altLang="en-US" dirty="0"/>
+                  <a:t>因为损失函数变化了，所以在后向传播中计算输出层的误差项时，</a:t>
+                </a:r>
+                <a:r>
+                  <a:rPr kumimoji="1" lang="en-US" altLang="zh-CN" dirty="0">
+                    <a:solidFill>
+                      <a:schemeClr val="bg2"/>
+                    </a:solidFill>
+                  </a:rPr>
+                  <a:t> </a:t>
+                </a:r>
+                <a14:m>
+                  <m:oMath xmlns:m="http://schemas.openxmlformats.org/officeDocument/2006/math">
+                    <m:f>
+                      <m:fPr>
+                        <m:ctrlPr>
+                          <a:rPr kumimoji="1" lang="en-US" altLang="zh-CN" i="1" smtClean="0">
+                            <a:solidFill>
+                              <a:schemeClr val="tx1"/>
+                            </a:solidFill>
+                            <a:latin typeface="Cambria Math" panose="02040503050406030204" pitchFamily="18" charset="0"/>
+                          </a:rPr>
+                        </m:ctrlPr>
+                      </m:fPr>
+                      <m:num>
+                        <m:r>
+                          <a:rPr kumimoji="1" lang="en-US" altLang="zh-CN" b="0" i="1" smtClean="0">
+                            <a:solidFill>
+                              <a:schemeClr val="tx1"/>
+                            </a:solidFill>
+                            <a:latin typeface="Cambria Math" panose="02040503050406030204" pitchFamily="18" charset="0"/>
+                          </a:rPr>
+                          <m:t>𝑑𝐸</m:t>
+                        </m:r>
+                      </m:num>
+                      <m:den>
+                        <m:r>
+                          <a:rPr kumimoji="1" lang="en-US" altLang="zh-CN" b="0" i="1" smtClean="0">
+                            <a:solidFill>
+                              <a:schemeClr val="tx1"/>
+                            </a:solidFill>
+                            <a:latin typeface="Cambria Math" panose="02040503050406030204" pitchFamily="18" charset="0"/>
+                          </a:rPr>
+                          <m:t>𝑑</m:t>
+                        </m:r>
+                        <m:sSub>
+                          <m:sSubPr>
+                            <m:ctrlPr>
+                              <a:rPr kumimoji="1" lang="en-US" altLang="zh-CN" b="0" i="1" smtClean="0">
+                                <a:solidFill>
+                                  <a:schemeClr val="tx1"/>
+                                </a:solidFill>
+                                <a:latin typeface="Cambria Math" panose="02040503050406030204" pitchFamily="18" charset="0"/>
+                              </a:rPr>
+                            </m:ctrlPr>
+                          </m:sSubPr>
+                          <m:e>
+                            <m:r>
+                              <a:rPr kumimoji="1" lang="en-US" altLang="zh-CN" b="0" i="1" smtClean="0">
+                                <a:solidFill>
+                                  <a:schemeClr val="tx1"/>
+                                </a:solidFill>
+                                <a:latin typeface="Cambria Math" panose="02040503050406030204" pitchFamily="18" charset="0"/>
+                              </a:rPr>
+                              <m:t>𝑦</m:t>
+                            </m:r>
+                          </m:e>
+                          <m:sub>
+                            <m:r>
+                              <a:rPr kumimoji="1" lang="en-US" altLang="zh-CN" b="0" i="1" smtClean="0">
+                                <a:solidFill>
+                                  <a:schemeClr val="tx1"/>
+                                </a:solidFill>
+                                <a:latin typeface="Cambria Math" panose="02040503050406030204" pitchFamily="18" charset="0"/>
+                              </a:rPr>
+                              <m:t>𝑘</m:t>
+                            </m:r>
+                          </m:sub>
+                        </m:sSub>
+                      </m:den>
+                    </m:f>
+                  </m:oMath>
+                </a14:m>
+                <a:r>
+                  <a:rPr kumimoji="1" lang="zh-CN" altLang="en-US" dirty="0"/>
+                  <a:t>应该要修改（目前暂时不修改，因为以后会再次修改损失函数）</a:t>
+                </a:r>
+                <a:endParaRPr kumimoji="1" lang="en-US" altLang="zh-CN" dirty="0"/>
+              </a:p>
+            </p:txBody>
+          </p:sp>
+        </mc:Choice>
+        <mc:Fallback>
+          <p:sp>
+            <p:nvSpPr>
+              <p:cNvPr id="2" name="文本框 1">
+                <a:extLst>
+                  <a:ext uri="{FF2B5EF4-FFF2-40B4-BE49-F238E27FC236}">
+                    <a16:creationId xmlns:a16="http://schemas.microsoft.com/office/drawing/2014/main" id="{9E9BD0BD-7653-0A88-0432-4DCCF71865B1}"/>
+                  </a:ext>
+                </a:extLst>
+              </p:cNvPr>
+              <p:cNvSpPr txBox="1">
+                <a:spLocks noRot="1" noChangeAspect="1" noMove="1" noResize="1" noEditPoints="1" noAdjustHandles="1" noChangeArrowheads="1" noChangeShapeType="1" noTextEdit="1"/>
+              </p:cNvSpPr>
+              <p:nvPr/>
+            </p:nvSpPr>
+            <p:spPr>
+              <a:xfrm>
+                <a:off x="1868992" y="4642318"/>
+                <a:ext cx="10190935" cy="1357423"/>
+              </a:xfrm>
+              <a:prstGeom prst="rect">
+                <a:avLst/>
+              </a:prstGeom>
+              <a:blipFill>
+                <a:blip r:embed="rId3"/>
+                <a:stretch>
+                  <a:fillRect l="-374" t="-1852" b="-5556"/>
+                </a:stretch>
+              </a:blipFill>
+            </p:spPr>
+            <p:txBody>
+              <a:bodyPr/>
+              <a:lstStyle/>
+              <a:p>
+                <a:r>
+                  <a:rPr lang="zh-CN" altLang="en-US">
+                    <a:noFill/>
+                  </a:rPr>
+                  <a:t> </a:t>
+                </a:r>
+              </a:p>
+            </p:txBody>
+          </p:sp>
+        </mc:Fallback>
+      </mc:AlternateContent>
     </p:spTree>
     <p:custDataLst>
       <p:tags r:id="rId1"/>
@@ -10059,7 +10469,7 @@
                             </p:stCondLst>
                             <p:childTnLst>
                               <p:par>
-                                <p:cTn id="5" presetID="1" presetClass="entr" presetSubtype="0" fill="hold" grpId="0" nodeType="clickEffect">
+                                <p:cTn id="5" presetID="1" presetClass="entr" presetSubtype="0" fill="hold" nodeType="clickEffect">
                                   <p:stCondLst>
                                     <p:cond delay="0"/>
                                   </p:stCondLst>
@@ -10072,7 +10482,203 @@
                                           </p:stCondLst>
                                         </p:cTn>
                                         <p:tgtEl>
-                                          <p:spTgt spid="6"/>
+                                          <p:spTgt spid="6">
+                                            <p:txEl>
+                                              <p:pRg st="0" end="0"/>
+                                            </p:txEl>
+                                          </p:spTgt>
+                                        </p:tgtEl>
+                                        <p:attrNameLst>
+                                          <p:attrName>style.visibility</p:attrName>
+                                        </p:attrNameLst>
+                                      </p:cBhvr>
+                                      <p:to>
+                                        <p:strVal val="visible"/>
+                                      </p:to>
+                                    </p:set>
+                                  </p:childTnLst>
+                                </p:cTn>
+                              </p:par>
+                            </p:childTnLst>
+                          </p:cTn>
+                        </p:par>
+                      </p:childTnLst>
+                    </p:cTn>
+                  </p:par>
+                  <p:par>
+                    <p:cTn id="7" fill="hold">
+                      <p:stCondLst>
+                        <p:cond delay="indefinite"/>
+                      </p:stCondLst>
+                      <p:childTnLst>
+                        <p:par>
+                          <p:cTn id="8" fill="hold">
+                            <p:stCondLst>
+                              <p:cond delay="0"/>
+                            </p:stCondLst>
+                            <p:childTnLst>
+                              <p:par>
+                                <p:cTn id="9" presetID="1" presetClass="entr" presetSubtype="0" fill="hold" nodeType="clickEffect">
+                                  <p:stCondLst>
+                                    <p:cond delay="0"/>
+                                  </p:stCondLst>
+                                  <p:childTnLst>
+                                    <p:set>
+                                      <p:cBhvr>
+                                        <p:cTn id="10" dur="1" fill="hold">
+                                          <p:stCondLst>
+                                            <p:cond delay="0"/>
+                                          </p:stCondLst>
+                                        </p:cTn>
+                                        <p:tgtEl>
+                                          <p:spTgt spid="6">
+                                            <p:txEl>
+                                              <p:pRg st="1" end="1"/>
+                                            </p:txEl>
+                                          </p:spTgt>
+                                        </p:tgtEl>
+                                        <p:attrNameLst>
+                                          <p:attrName>style.visibility</p:attrName>
+                                        </p:attrNameLst>
+                                      </p:cBhvr>
+                                      <p:to>
+                                        <p:strVal val="visible"/>
+                                      </p:to>
+                                    </p:set>
+                                  </p:childTnLst>
+                                </p:cTn>
+                              </p:par>
+                            </p:childTnLst>
+                          </p:cTn>
+                        </p:par>
+                      </p:childTnLst>
+                    </p:cTn>
+                  </p:par>
+                  <p:par>
+                    <p:cTn id="11" fill="hold">
+                      <p:stCondLst>
+                        <p:cond delay="indefinite"/>
+                      </p:stCondLst>
+                      <p:childTnLst>
+                        <p:par>
+                          <p:cTn id="12" fill="hold">
+                            <p:stCondLst>
+                              <p:cond delay="0"/>
+                            </p:stCondLst>
+                            <p:childTnLst>
+                              <p:par>
+                                <p:cTn id="13" presetID="1" presetClass="entr" presetSubtype="0" fill="hold" grpId="0" nodeType="clickEffect">
+                                  <p:stCondLst>
+                                    <p:cond delay="0"/>
+                                  </p:stCondLst>
+                                  <p:childTnLst>
+                                    <p:set>
+                                      <p:cBhvr>
+                                        <p:cTn id="14" dur="1" fill="hold">
+                                          <p:stCondLst>
+                                            <p:cond delay="0"/>
+                                          </p:stCondLst>
+                                        </p:cTn>
+                                        <p:tgtEl>
+                                          <p:spTgt spid="2"/>
+                                        </p:tgtEl>
+                                        <p:attrNameLst>
+                                          <p:attrName>style.visibility</p:attrName>
+                                        </p:attrNameLst>
+                                      </p:cBhvr>
+                                      <p:to>
+                                        <p:strVal val="visible"/>
+                                      </p:to>
+                                    </p:set>
+                                  </p:childTnLst>
+                                </p:cTn>
+                              </p:par>
+                            </p:childTnLst>
+                          </p:cTn>
+                        </p:par>
+                      </p:childTnLst>
+                    </p:cTn>
+                  </p:par>
+                  <p:par>
+                    <p:cTn id="15" fill="hold">
+                      <p:stCondLst>
+                        <p:cond delay="indefinite"/>
+                      </p:stCondLst>
+                      <p:childTnLst>
+                        <p:par>
+                          <p:cTn id="16" fill="hold">
+                            <p:stCondLst>
+                              <p:cond delay="0"/>
+                            </p:stCondLst>
+                            <p:childTnLst>
+                              <p:par>
+                                <p:cTn id="17" presetID="1" presetClass="entr" presetSubtype="0" fill="hold" nodeType="clickEffect">
+                                  <p:stCondLst>
+                                    <p:cond delay="0"/>
+                                  </p:stCondLst>
+                                  <p:childTnLst>
+                                    <p:set>
+                                      <p:cBhvr>
+                                        <p:cTn id="18" dur="1" fill="hold">
+                                          <p:stCondLst>
+                                            <p:cond delay="0"/>
+                                          </p:stCondLst>
+                                        </p:cTn>
+                                        <p:tgtEl>
+                                          <p:spTgt spid="6">
+                                            <p:txEl>
+                                              <p:pRg st="2" end="2"/>
+                                            </p:txEl>
+                                          </p:spTgt>
+                                        </p:tgtEl>
+                                        <p:attrNameLst>
+                                          <p:attrName>style.visibility</p:attrName>
+                                        </p:attrNameLst>
+                                      </p:cBhvr>
+                                      <p:to>
+                                        <p:strVal val="visible"/>
+                                      </p:to>
+                                    </p:set>
+                                  </p:childTnLst>
+                                </p:cTn>
+                              </p:par>
+                            </p:childTnLst>
+                          </p:cTn>
+                        </p:par>
+                      </p:childTnLst>
+                    </p:cTn>
+                  </p:par>
+                  <p:par>
+                    <p:cTn id="19" fill="hold">
+                      <p:stCondLst>
+                        <p:cond delay="indefinite"/>
+                      </p:stCondLst>
+                      <p:childTnLst>
+                        <p:par>
+                          <p:cTn id="20" fill="hold">
+                            <p:stCondLst>
+                              <p:cond delay="0"/>
+                            </p:stCondLst>
+                            <p:childTnLst>
+                              <p:par>
+                                <p:cTn id="21" presetID="1" presetClass="entr" presetSubtype="0" fill="hold" nodeType="clickEffect">
+                                  <p:stCondLst>
+                                    <p:cond delay="0"/>
+                                  </p:stCondLst>
+                                  <p:childTnLst>
+                                    <p:set>
+                                      <p:cBhvr>
+                                        <p:cTn id="22" dur="1" fill="hold">
+                                          <p:stCondLst>
+                                            <p:cond delay="0"/>
+                                          </p:stCondLst>
+                                        </p:cTn>
+                                        <p:tgtEl>
+                                          <p:spTgt spid="6">
+                                            <p:txEl>
+                                              <p:pRg st="3" end="3"/>
+                                            </p:txEl>
+                                          </p:spTgt>
                                         </p:tgtEl>
                                         <p:attrNameLst>
                                           <p:attrName>style.visibility</p:attrName>
@@ -10113,7 +10719,7 @@
       </p:par>
     </p:tnLst>
     <p:bldLst>
-      <p:bldP spid="6" grpId="0"/>
+      <p:bldP spid="2" grpId="0"/>
     </p:bldLst>
   </p:timing>
 </p:sld>
@@ -10155,7 +10761,7 @@
               <a:rPr lang="zh-CN" altLang="en-US" dirty="0">
                 <a:sym typeface="+mn-ea"/>
               </a:rPr>
-              <a:t>任务：修复</a:t>
+              <a:t>任务：重构调试代码</a:t>
             </a:r>
             <a:endParaRPr dirty="0">
               <a:sym typeface="+mn-ea"/>
@@ -10398,7 +11004,7 @@
             </a:pPr>
             <a:r>
               <a:rPr lang="zh-CN" altLang="en-US" dirty="0"/>
-              <a:t>如何修复？</a:t>
+              <a:t>请增加异常检查的代码，自动化检查异常数据？</a:t>
             </a:r>
             <a:endParaRPr lang="en-US" altLang="zh-CN" dirty="0"/>
           </a:p>
@@ -10409,7 +11015,7 @@
             </a:pPr>
             <a:r>
               <a:rPr lang="zh-CN" altLang="en-US" dirty="0"/>
-              <a:t>请实现修复</a:t>
+              <a:t>请每个同学都运行代码，看下是否通过了自动化检查？</a:t>
             </a:r>
             <a:endParaRPr lang="en-US" altLang="zh-CN" dirty="0"/>
           </a:p>
@@ -10420,7 +11026,7 @@
             </a:pPr>
             <a:r>
               <a:rPr lang="zh-CN" altLang="en-US" dirty="0"/>
-              <a:t>请每个同学都运行修复后的代码，看下是否收敛？</a:t>
+              <a:t>请每个同学都调整下学习率，看下结果？</a:t>
             </a:r>
             <a:endParaRPr lang="en-US" altLang="zh-CN" dirty="0"/>
           </a:p>
@@ -10502,310 +11108,13 @@
           </a:p>
         </p:txBody>
       </p:sp>
-      <p:sp>
-        <p:nvSpPr>
-          <p:cNvPr id="4" name="文本框 3">
-            <a:extLst>
-              <a:ext uri="{FF2B5EF4-FFF2-40B4-BE49-F238E27FC236}">
-                <a16:creationId xmlns:a16="http://schemas.microsoft.com/office/drawing/2014/main" id="{D41A8F72-449C-EAA6-0B76-7706CA88B4A2}"/>
-              </a:ext>
-            </a:extLst>
-          </p:cNvPr>
-          <p:cNvSpPr txBox="1"/>
-          <p:nvPr/>
-        </p:nvSpPr>
-        <p:spPr>
-          <a:xfrm>
-            <a:off x="6732396" y="1949380"/>
-            <a:ext cx="2123338" cy="923330"/>
-          </a:xfrm>
-          <a:prstGeom prst="rect">
-            <a:avLst/>
-          </a:prstGeom>
-          <a:noFill/>
-        </p:spPr>
-        <p:txBody>
-          <a:bodyPr wrap="none" rtlCol="0">
-            <a:spAutoFit/>
-          </a:bodyPr>
-          <a:lstStyle/>
-          <a:p>
-            <a:pPr marL="285750" indent="-285750">
-              <a:buFont typeface="Arial" panose="020B0604020202020204" pitchFamily="34" charset="0"/>
-              <a:buChar char="•"/>
-            </a:pPr>
-            <a:r>
-              <a:rPr kumimoji="1" lang="zh-CN" altLang="en-US" dirty="0"/>
-              <a:t>增大学习率</a:t>
-            </a:r>
-            <a:endParaRPr kumimoji="1" lang="en-US" altLang="zh-CN" dirty="0"/>
-          </a:p>
-          <a:p>
-            <a:pPr marL="285750" indent="-285750">
-              <a:buFont typeface="Arial" panose="020B0604020202020204" pitchFamily="34" charset="0"/>
-              <a:buChar char="•"/>
-            </a:pPr>
-            <a:r>
-              <a:rPr kumimoji="1" lang="zh-CN" altLang="en-US" dirty="0"/>
-              <a:t>避免加权和过大</a:t>
-            </a:r>
-            <a:br>
-              <a:rPr kumimoji="1" lang="en-US" altLang="zh-CN" dirty="0"/>
-            </a:br>
-            <a:r>
-              <a:rPr kumimoji="1" lang="en-US" altLang="zh-CN" dirty="0"/>
-              <a:t>TODO </a:t>
-            </a:r>
-            <a:r>
-              <a:rPr kumimoji="1" lang="zh-CN" altLang="en-US" dirty="0"/>
-              <a:t>给出原因</a:t>
-            </a:r>
-            <a:endParaRPr kumimoji="1" lang="en-US" altLang="zh-CN" dirty="0"/>
-          </a:p>
-        </p:txBody>
-      </p:sp>
-      <mc:AlternateContent xmlns:mc="http://schemas.openxmlformats.org/markup-compatibility/2006">
-        <mc:Choice xmlns:a14="http://schemas.microsoft.com/office/drawing/2010/main" Requires="a14">
-          <p:sp>
-            <p:nvSpPr>
-              <p:cNvPr id="2" name="文本框 1">
-                <a:extLst>
-                  <a:ext uri="{FF2B5EF4-FFF2-40B4-BE49-F238E27FC236}">
-                    <a16:creationId xmlns:a16="http://schemas.microsoft.com/office/drawing/2014/main" id="{20ADF61C-E4BF-E46D-8220-EB0FB4E8D591}"/>
-                  </a:ext>
-                </a:extLst>
-              </p:cNvPr>
-              <p:cNvSpPr txBox="1"/>
-              <p:nvPr/>
-            </p:nvSpPr>
-            <p:spPr>
-              <a:xfrm>
-                <a:off x="6774287" y="3165787"/>
-                <a:ext cx="4887364" cy="1237518"/>
-              </a:xfrm>
-              <a:prstGeom prst="rect">
-                <a:avLst/>
-              </a:prstGeom>
-              <a:noFill/>
-            </p:spPr>
-            <p:txBody>
-              <a:bodyPr wrap="none" rtlCol="0">
-                <a:spAutoFit/>
-              </a:bodyPr>
-              <a:lstStyle/>
-              <a:p>
-                <a14:m>
-                  <m:oMath xmlns:m="http://schemas.openxmlformats.org/officeDocument/2006/math">
-                    <m:f>
-                      <m:fPr>
-                        <m:ctrlPr>
-                          <a:rPr kumimoji="1" lang="en-US" altLang="zh-CN" i="1" smtClean="0">
-                            <a:solidFill>
-                              <a:schemeClr val="bg2"/>
-                            </a:solidFill>
-                            <a:latin typeface="Cambria Math" panose="02040503050406030204" pitchFamily="18" charset="0"/>
-                          </a:rPr>
-                        </m:ctrlPr>
-                      </m:fPr>
-                      <m:num>
-                        <m:r>
-                          <a:rPr kumimoji="1" lang="en-US" altLang="zh-CN" b="0" i="1" smtClean="0">
-                            <a:solidFill>
-                              <a:schemeClr val="bg2"/>
-                            </a:solidFill>
-                            <a:latin typeface="Cambria Math" panose="02040503050406030204" pitchFamily="18" charset="0"/>
-                          </a:rPr>
-                          <m:t>𝑑𝐸</m:t>
-                        </m:r>
-                      </m:num>
-                      <m:den>
-                        <m:r>
-                          <a:rPr kumimoji="1" lang="en-US" altLang="zh-CN" b="0" i="1" smtClean="0">
-                            <a:solidFill>
-                              <a:schemeClr val="bg2"/>
-                            </a:solidFill>
-                            <a:latin typeface="Cambria Math" panose="02040503050406030204" pitchFamily="18" charset="0"/>
-                          </a:rPr>
-                          <m:t>𝑑</m:t>
-                        </m:r>
-                        <m:sSub>
-                          <m:sSubPr>
-                            <m:ctrlPr>
-                              <a:rPr kumimoji="1" lang="en-US" altLang="zh-CN" b="0" i="1" smtClean="0">
-                                <a:solidFill>
-                                  <a:schemeClr val="bg2"/>
-                                </a:solidFill>
-                                <a:latin typeface="Cambria Math" panose="02040503050406030204" pitchFamily="18" charset="0"/>
-                              </a:rPr>
-                            </m:ctrlPr>
-                          </m:sSubPr>
-                          <m:e>
-                            <m:r>
-                              <a:rPr kumimoji="1" lang="en-US" altLang="zh-CN" b="0" i="1" smtClean="0">
-                                <a:solidFill>
-                                  <a:schemeClr val="bg2"/>
-                                </a:solidFill>
-                                <a:latin typeface="Cambria Math" panose="02040503050406030204" pitchFamily="18" charset="0"/>
-                              </a:rPr>
-                              <m:t>𝑦</m:t>
-                            </m:r>
-                          </m:e>
-                          <m:sub>
-                            <m:r>
-                              <a:rPr kumimoji="1" lang="en-US" altLang="zh-CN" b="0" i="1" smtClean="0">
-                                <a:solidFill>
-                                  <a:schemeClr val="bg2"/>
-                                </a:solidFill>
-                                <a:latin typeface="Cambria Math" panose="02040503050406030204" pitchFamily="18" charset="0"/>
-                              </a:rPr>
-                              <m:t>𝑘</m:t>
-                            </m:r>
-                          </m:sub>
-                        </m:sSub>
-                      </m:den>
-                    </m:f>
-                  </m:oMath>
-                </a14:m>
-                <a:r>
-                  <a:rPr kumimoji="1" lang="zh-CN" altLang="en-US" dirty="0">
-                    <a:solidFill>
-                      <a:schemeClr val="bg2"/>
-                    </a:solidFill>
-                  </a:rPr>
-                  <a:t>也有问题，但不知道如何求导，所以先不管</a:t>
-                </a:r>
-                <a:endParaRPr kumimoji="1" lang="en-US" altLang="zh-CN" dirty="0">
-                  <a:solidFill>
-                    <a:schemeClr val="bg2"/>
-                  </a:solidFill>
-                </a:endParaRPr>
-              </a:p>
-              <a:p>
-                <a:r>
-                  <a:rPr kumimoji="1" lang="en-US" altLang="zh-CN" dirty="0"/>
-                  <a:t>TODO</a:t>
-                </a:r>
-                <a14:m>
-                  <m:oMath xmlns:m="http://schemas.openxmlformats.org/officeDocument/2006/math">
-                    <m:f>
-                      <m:fPr>
-                        <m:ctrlPr>
-                          <a:rPr kumimoji="1" lang="en-US" altLang="zh-CN" i="1" smtClean="0">
-                            <a:latin typeface="Cambria Math" panose="02040503050406030204" pitchFamily="18" charset="0"/>
-                          </a:rPr>
-                        </m:ctrlPr>
-                      </m:fPr>
-                      <m:num>
-                        <m:r>
-                          <a:rPr kumimoji="1" lang="en-US" altLang="zh-CN" b="0" i="1" smtClean="0">
-                            <a:latin typeface="Cambria Math" panose="02040503050406030204" pitchFamily="18" charset="0"/>
-                          </a:rPr>
-                          <m:t>𝑑𝐸</m:t>
-                        </m:r>
-                      </m:num>
-                      <m:den>
-                        <m:r>
-                          <a:rPr kumimoji="1" lang="en-US" altLang="zh-CN" b="0" i="1" smtClean="0">
-                            <a:latin typeface="Cambria Math" panose="02040503050406030204" pitchFamily="18" charset="0"/>
-                          </a:rPr>
-                          <m:t>𝑑</m:t>
-                        </m:r>
-                        <m:sSub>
-                          <m:sSubPr>
-                            <m:ctrlPr>
-                              <a:rPr kumimoji="1" lang="en-US" altLang="zh-CN" b="0" i="1" smtClean="0">
-                                <a:latin typeface="Cambria Math" panose="02040503050406030204" pitchFamily="18" charset="0"/>
-                              </a:rPr>
-                            </m:ctrlPr>
-                          </m:sSubPr>
-                          <m:e>
-                            <m:r>
-                              <a:rPr kumimoji="1" lang="en-US" altLang="zh-CN" b="0" i="1" smtClean="0">
-                                <a:latin typeface="Cambria Math" panose="02040503050406030204" pitchFamily="18" charset="0"/>
-                              </a:rPr>
-                              <m:t>𝑦</m:t>
-                            </m:r>
-                          </m:e>
-                          <m:sub>
-                            <m:r>
-                              <a:rPr kumimoji="1" lang="en-US" altLang="zh-CN" b="0" i="1" smtClean="0">
-                                <a:latin typeface="Cambria Math" panose="02040503050406030204" pitchFamily="18" charset="0"/>
-                              </a:rPr>
-                              <m:t>𝑘</m:t>
-                            </m:r>
-                          </m:sub>
-                        </m:sSub>
-                      </m:den>
-                    </m:f>
-                  </m:oMath>
-                </a14:m>
-                <a:r>
-                  <a:rPr kumimoji="1" lang="en-US" altLang="zh-CN" dirty="0"/>
-                  <a:t>=?</a:t>
-                </a:r>
-                <a:r>
-                  <a:rPr kumimoji="1" lang="zh-CN" altLang="en-US" dirty="0"/>
-                  <a:t>，并在后向传播中修改代码</a:t>
-                </a:r>
-              </a:p>
-              <a:p>
-                <a:endParaRPr kumimoji="1" lang="zh-CN" altLang="en-US" dirty="0"/>
-              </a:p>
-            </p:txBody>
-          </p:sp>
-        </mc:Choice>
-        <mc:Fallback>
-          <p:sp>
-            <p:nvSpPr>
-              <p:cNvPr id="2" name="文本框 1">
-                <a:extLst>
-                  <a:ext uri="{FF2B5EF4-FFF2-40B4-BE49-F238E27FC236}">
-                    <a16:creationId xmlns:a16="http://schemas.microsoft.com/office/drawing/2014/main" id="{20ADF61C-E4BF-E46D-8220-EB0FB4E8D591}"/>
-                  </a:ext>
-                </a:extLst>
-              </p:cNvPr>
-              <p:cNvSpPr txBox="1">
-                <a:spLocks noRot="1" noChangeAspect="1" noMove="1" noResize="1" noEditPoints="1" noAdjustHandles="1" noChangeArrowheads="1" noChangeShapeType="1" noTextEdit="1"/>
-              </p:cNvSpPr>
-              <p:nvPr/>
-            </p:nvSpPr>
-            <p:spPr>
-              <a:xfrm>
-                <a:off x="6774287" y="3165787"/>
-                <a:ext cx="4887364" cy="1237518"/>
-              </a:xfrm>
-              <a:prstGeom prst="rect">
-                <a:avLst/>
-              </a:prstGeom>
-              <a:blipFill>
-                <a:blip r:embed="rId3"/>
-                <a:stretch>
-                  <a:fillRect l="-1036"/>
-                </a:stretch>
-              </a:blipFill>
-            </p:spPr>
-            <p:txBody>
-              <a:bodyPr/>
-              <a:lstStyle/>
-              <a:p>
-                <a:r>
-                  <a:rPr lang="zh-CN" altLang="en-US">
-                    <a:noFill/>
-                  </a:rPr>
-                  <a:t> </a:t>
-                </a:r>
-              </a:p>
-            </p:txBody>
-          </p:sp>
-        </mc:Fallback>
-      </mc:AlternateContent>
     </p:spTree>
     <p:custDataLst>
       <p:tags r:id="rId1"/>
     </p:custDataLst>
     <p:extLst>
       <p:ext uri="{BB962C8B-B14F-4D97-AF65-F5344CB8AC3E}">
-        <p14:creationId xmlns:p14="http://schemas.microsoft.com/office/powerpoint/2010/main" val="293921898"/>
+        <p14:creationId xmlns:p14="http://schemas.microsoft.com/office/powerpoint/2010/main" val="1613480914"/>
       </p:ext>
     </p:extLst>
   </p:cSld>
@@ -10833,7 +11142,7 @@
                             </p:stCondLst>
                             <p:childTnLst>
                               <p:par>
-                                <p:cTn id="5" presetID="1" presetClass="entr" presetSubtype="0" fill="hold" grpId="0" nodeType="clickEffect">
+                                <p:cTn id="5" presetID="1" presetClass="entr" presetSubtype="0" fill="hold" nodeType="clickEffect">
                                   <p:stCondLst>
                                     <p:cond delay="0"/>
                                   </p:stCondLst>
@@ -10846,7 +11155,109 @@
                                           </p:stCondLst>
                                         </p:cTn>
                                         <p:tgtEl>
-                                          <p:spTgt spid="6"/>
+                                          <p:spTgt spid="6">
+                                            <p:txEl>
+                                              <p:pRg st="0" end="0"/>
+                                            </p:txEl>
+                                          </p:spTgt>
+                                        </p:tgtEl>
+                                        <p:attrNameLst>
+                                          <p:attrName>style.visibility</p:attrName>
+                                        </p:attrNameLst>
+                                      </p:cBhvr>
+                                      <p:to>
+                                        <p:strVal val="visible"/>
+                                      </p:to>
+                                    </p:set>
+                                  </p:childTnLst>
+                                </p:cTn>
+                              </p:par>
+                            </p:childTnLst>
+                          </p:cTn>
+                        </p:par>
+                      </p:childTnLst>
+                    </p:cTn>
+                  </p:par>
+                  <p:par>
+                    <p:cTn id="7" fill="hold">
+                      <p:stCondLst>
+                        <p:cond delay="indefinite"/>
+                      </p:stCondLst>
+                      <p:childTnLst>
+                        <p:par>
+                          <p:cTn id="8" fill="hold">
+                            <p:stCondLst>
+                              <p:cond delay="0"/>
+                            </p:stCondLst>
+                            <p:childTnLst>
+                              <p:par>
+                                <p:cTn id="9" presetID="1" presetClass="entr" presetSubtype="0" fill="hold" nodeType="clickEffect">
+                                  <p:stCondLst>
+                                    <p:cond delay="0"/>
+                                  </p:stCondLst>
+                                  <p:childTnLst>
+                                    <p:set>
+                                      <p:cBhvr>
+                                        <p:cTn id="10" dur="1" fill="hold">
+                                          <p:stCondLst>
+                                            <p:cond delay="0"/>
+                                          </p:stCondLst>
+                                        </p:cTn>
+                                        <p:tgtEl>
+                                          <p:spTgt spid="6">
+                                            <p:txEl>
+                                              <p:pRg st="1" end="1"/>
+                                            </p:txEl>
+                                          </p:spTgt>
+                                        </p:tgtEl>
+                                        <p:attrNameLst>
+                                          <p:attrName>style.visibility</p:attrName>
+                                        </p:attrNameLst>
+                                      </p:cBhvr>
+                                      <p:to>
+                                        <p:strVal val="visible"/>
+                                      </p:to>
+                                    </p:set>
+                                  </p:childTnLst>
+                                </p:cTn>
+                              </p:par>
+                            </p:childTnLst>
+                          </p:cTn>
+                        </p:par>
+                      </p:childTnLst>
+                    </p:cTn>
+                  </p:par>
+                  <p:par>
+                    <p:cTn id="11" fill="hold">
+                      <p:stCondLst>
+                        <p:cond delay="indefinite"/>
+                      </p:stCondLst>
+                      <p:childTnLst>
+                        <p:par>
+                          <p:cTn id="12" fill="hold">
+                            <p:stCondLst>
+                              <p:cond delay="0"/>
+                            </p:stCondLst>
+                            <p:childTnLst>
+                              <p:par>
+                                <p:cTn id="13" presetID="1" presetClass="entr" presetSubtype="0" fill="hold" nodeType="clickEffect">
+                                  <p:stCondLst>
+                                    <p:cond delay="0"/>
+                                  </p:stCondLst>
+                                  <p:childTnLst>
+                                    <p:set>
+                                      <p:cBhvr>
+                                        <p:cTn id="14" dur="1" fill="hold">
+                                          <p:stCondLst>
+                                            <p:cond delay="0"/>
+                                          </p:stCondLst>
+                                        </p:cTn>
+                                        <p:tgtEl>
+                                          <p:spTgt spid="6">
+                                            <p:txEl>
+                                              <p:pRg st="2" end="2"/>
+                                            </p:txEl>
+                                          </p:spTgt>
                                         </p:tgtEl>
                                         <p:attrNameLst>
                                           <p:attrName>style.visibility</p:attrName>
@@ -10886,9 +11297,6 @@
         </p:cTn>
       </p:par>
     </p:tnLst>
-    <p:bldLst>
-      <p:bldP spid="6" grpId="0"/>
-    </p:bldLst>
   </p:timing>
 </p:sld>
 </file>
@@ -10988,10 +11396,8 @@
           <a:lstStyle/>
           <a:p>
             <a:r>
-              <a:rPr lang="zh-CN" altLang="en-US" dirty="0">
-                <a:sym typeface="+mn-ea"/>
-              </a:rPr>
-              <a:t>任务：重构调试代码</a:t>
+              <a:rPr lang="zh-CN" altLang="en-US" dirty="0"/>
+              <a:t>结学</a:t>
             </a:r>
             <a:endParaRPr dirty="0">
               <a:sym typeface="+mn-ea"/>
@@ -11234,7 +11640,7 @@
             </a:pPr>
             <a:r>
               <a:rPr lang="zh-CN" altLang="en-US" dirty="0"/>
-              <a:t>一个一个去手动检查打印的值太麻烦，如何才能自动化地检查？</a:t>
+              <a:t>未收敛的原因的原因是什么？</a:t>
             </a:r>
             <a:endParaRPr lang="en-US" altLang="zh-CN" dirty="0"/>
           </a:p>
@@ -11245,7 +11651,7 @@
             </a:pPr>
             <a:r>
               <a:rPr lang="zh-CN" altLang="en-US" dirty="0"/>
-              <a:t>请实现代码</a:t>
+              <a:t>如何修复？</a:t>
             </a:r>
             <a:endParaRPr lang="en-US" altLang="zh-CN" dirty="0"/>
           </a:p>
@@ -11256,7 +11662,7 @@
             </a:pPr>
             <a:r>
               <a:rPr lang="zh-CN" altLang="en-US" dirty="0"/>
-              <a:t>请每个同学都运行代码，看下是否通过了自动化检查？</a:t>
+              <a:t>如何自动化地检查？</a:t>
             </a:r>
             <a:endParaRPr lang="en-US" altLang="zh-CN" dirty="0"/>
           </a:p>
@@ -11265,13 +11671,6 @@
               <a:buFont typeface="Arial" panose="020B0604020202020204" pitchFamily="34" charset="0"/>
               <a:buChar char="•"/>
             </a:pPr>
-            <a:r>
-              <a:rPr lang="zh-CN" altLang="en-US" dirty="0"/>
-              <a:t>恢复梯度检查后的代码是什么？</a:t>
-            </a:r>
-            <a:endParaRPr lang="en-US" altLang="zh-CN" dirty="0"/>
-          </a:p>
-          <a:p>
             <a:endParaRPr lang="en-US" altLang="zh-CN" dirty="0"/>
           </a:p>
           <a:p>
@@ -11355,7 +11754,7 @@
     </p:custDataLst>
     <p:extLst>
       <p:ext uri="{BB962C8B-B14F-4D97-AF65-F5344CB8AC3E}">
-        <p14:creationId xmlns:p14="http://schemas.microsoft.com/office/powerpoint/2010/main" val="1613480914"/>
+        <p14:creationId xmlns:p14="http://schemas.microsoft.com/office/powerpoint/2010/main" val="11973512"/>
       </p:ext>
     </p:extLst>
   </p:cSld>
@@ -11383,7 +11782,7 @@
                             </p:stCondLst>
                             <p:childTnLst>
                               <p:par>
-                                <p:cTn id="5" presetID="1" presetClass="entr" presetSubtype="0" fill="hold" grpId="0" nodeType="clickEffect">
+                                <p:cTn id="5" presetID="1" presetClass="entr" presetSubtype="0" fill="hold" nodeType="clickEffect">
                                   <p:stCondLst>
                                     <p:cond delay="0"/>
                                   </p:stCondLst>
@@ -11396,7 +11795,109 @@
                                           </p:stCondLst>
                                         </p:cTn>
                                         <p:tgtEl>
-                                          <p:spTgt spid="6"/>
+                                          <p:spTgt spid="6">
+                                            <p:txEl>
+                                              <p:pRg st="0" end="0"/>
+                                            </p:txEl>
+                                          </p:spTgt>
+                                        </p:tgtEl>
+                                        <p:attrNameLst>
+                                          <p:attrName>style.visibility</p:attrName>
+                                        </p:attrNameLst>
+                                      </p:cBhvr>
+                                      <p:to>
+                                        <p:strVal val="visible"/>
+                                      </p:to>
+                                    </p:set>
+                                  </p:childTnLst>
+                                </p:cTn>
+                              </p:par>
+                            </p:childTnLst>
+                          </p:cTn>
+                        </p:par>
+                      </p:childTnLst>
+                    </p:cTn>
+                  </p:par>
+                  <p:par>
+                    <p:cTn id="7" fill="hold">
+                      <p:stCondLst>
+                        <p:cond delay="indefinite"/>
+                      </p:stCondLst>
+                      <p:childTnLst>
+                        <p:par>
+                          <p:cTn id="8" fill="hold">
+                            <p:stCondLst>
+                              <p:cond delay="0"/>
+                            </p:stCondLst>
+                            <p:childTnLst>
+                              <p:par>
+                                <p:cTn id="9" presetID="1" presetClass="entr" presetSubtype="0" fill="hold" nodeType="clickEffect">
+                                  <p:stCondLst>
+                                    <p:cond delay="0"/>
+                                  </p:stCondLst>
+                                  <p:childTnLst>
+                                    <p:set>
+                                      <p:cBhvr>
+                                        <p:cTn id="10" dur="1" fill="hold">
+                                          <p:stCondLst>
+                                            <p:cond delay="0"/>
+                                          </p:stCondLst>
+                                        </p:cTn>
+                                        <p:tgtEl>
+                                          <p:spTgt spid="6">
+                                            <p:txEl>
+                                              <p:pRg st="1" end="1"/>
+                                            </p:txEl>
+                                          </p:spTgt>
+                                        </p:tgtEl>
+                                        <p:attrNameLst>
+                                          <p:attrName>style.visibility</p:attrName>
+                                        </p:attrNameLst>
+                                      </p:cBhvr>
+                                      <p:to>
+                                        <p:strVal val="visible"/>
+                                      </p:to>
+                                    </p:set>
+                                  </p:childTnLst>
+                                </p:cTn>
+                              </p:par>
+                            </p:childTnLst>
+                          </p:cTn>
+                        </p:par>
+                      </p:childTnLst>
+                    </p:cTn>
+                  </p:par>
+                  <p:par>
+                    <p:cTn id="11" fill="hold">
+                      <p:stCondLst>
+                        <p:cond delay="indefinite"/>
+                      </p:stCondLst>
+                      <p:childTnLst>
+                        <p:par>
+                          <p:cTn id="12" fill="hold">
+                            <p:stCondLst>
+                              <p:cond delay="0"/>
+                            </p:stCondLst>
+                            <p:childTnLst>
+                              <p:par>
+                                <p:cTn id="13" presetID="1" presetClass="entr" presetSubtype="0" fill="hold" nodeType="clickEffect">
+                                  <p:stCondLst>
+                                    <p:cond delay="0"/>
+                                  </p:stCondLst>
+                                  <p:childTnLst>
+                                    <p:set>
+                                      <p:cBhvr>
+                                        <p:cTn id="14" dur="1" fill="hold">
+                                          <p:stCondLst>
+                                            <p:cond delay="0"/>
+                                          </p:stCondLst>
+                                        </p:cTn>
+                                        <p:tgtEl>
+                                          <p:spTgt spid="6">
+                                            <p:txEl>
+                                              <p:pRg st="2" end="2"/>
+                                            </p:txEl>
+                                          </p:spTgt>
                                         </p:tgtEl>
                                         <p:attrNameLst>
                                           <p:attrName>style.visibility</p:attrName>
@@ -11436,14 +11937,69 @@
         </p:cTn>
       </p:par>
     </p:tnLst>
-    <p:bldLst>
-      <p:bldP spid="6" grpId="0"/>
-    </p:bldLst>
   </p:timing>
 </p:sld>
 </file>
 
 <file path=ppt/slides/slide21.xml><?xml version="1.0" encoding="utf-8"?>
+<p:sld xmlns:a="http://schemas.openxmlformats.org/drawingml/2006/main" xmlns:r="http://schemas.openxmlformats.org/officeDocument/2006/relationships" xmlns:p="http://schemas.openxmlformats.org/presentationml/2006/main">
+  <p:cSld>
+    <p:spTree>
+      <p:nvGrpSpPr>
+        <p:cNvPr id="1" name=""/>
+        <p:cNvGrpSpPr/>
+        <p:nvPr/>
+      </p:nvGrpSpPr>
+      <p:grpSpPr>
+        <a:xfrm>
+          <a:off x="0" y="0"/>
+          <a:ext cx="0" cy="0"/>
+          <a:chOff x="0" y="0"/>
+          <a:chExt cx="0" cy="0"/>
+        </a:xfrm>
+      </p:grpSpPr>
+      <p:sp>
+        <p:nvSpPr>
+          <p:cNvPr id="2" name="标题 1"/>
+          <p:cNvSpPr>
+            <a:spLocks noGrp="1"/>
+          </p:cNvSpPr>
+          <p:nvPr>
+            <p:ph type="title"/>
+          </p:nvPr>
+        </p:nvSpPr>
+        <p:spPr/>
+        <p:txBody>
+          <a:bodyPr/>
+          <a:lstStyle/>
+          <a:p>
+            <a:r>
+              <a:rPr lang="zh-CN" altLang="en-US" dirty="0">
+                <a:sym typeface="+mn-ea"/>
+              </a:rPr>
+              <a:t>任务：恢复梯度检查</a:t>
+            </a:r>
+            <a:endParaRPr lang="zh-CN" altLang="en-US" dirty="0"/>
+          </a:p>
+        </p:txBody>
+      </p:sp>
+    </p:spTree>
+    <p:custDataLst>
+      <p:tags r:id="rId1"/>
+    </p:custDataLst>
+    <p:extLst>
+      <p:ext uri="{BB962C8B-B14F-4D97-AF65-F5344CB8AC3E}">
+        <p14:creationId xmlns:p14="http://schemas.microsoft.com/office/powerpoint/2010/main" val="2370231121"/>
+      </p:ext>
+    </p:extLst>
+  </p:cSld>
+  <p:clrMapOvr>
+    <a:masterClrMapping/>
+  </p:clrMapOvr>
+</p:sld>
+</file>
+
+<file path=ppt/slides/slide22.xml><?xml version="1.0" encoding="utf-8"?>
 <p:sld xmlns:a="http://schemas.openxmlformats.org/drawingml/2006/main" xmlns:r="http://schemas.openxmlformats.org/officeDocument/2006/relationships" xmlns:p="http://schemas.openxmlformats.org/presentationml/2006/main">
   <p:cSld>
     <p:spTree>
@@ -11476,8 +12032,10 @@
           <a:lstStyle/>
           <a:p>
             <a:r>
-              <a:rPr lang="zh-CN" altLang="en-US" dirty="0"/>
-              <a:t>结学</a:t>
+              <a:rPr lang="zh-CN" altLang="en-US" dirty="0">
+                <a:sym typeface="+mn-ea"/>
+              </a:rPr>
+              <a:t>任务：恢复梯度检查</a:t>
             </a:r>
             <a:endParaRPr dirty="0">
               <a:sym typeface="+mn-ea"/>
@@ -11720,7 +12278,7 @@
             </a:pPr>
             <a:r>
               <a:rPr lang="zh-CN" altLang="en-US" dirty="0"/>
-              <a:t>未收敛的原因的原因是什么？</a:t>
+              <a:t>恢复梯度检查后的代码是什么？</a:t>
             </a:r>
             <a:endParaRPr lang="en-US" altLang="zh-CN" dirty="0"/>
           </a:p>
@@ -11731,26 +12289,11 @@
             </a:pPr>
             <a:r>
               <a:rPr lang="zh-CN" altLang="en-US" dirty="0"/>
-              <a:t>如何修复？</a:t>
+              <a:t>请每个同学都运行代码，看下是否通过了梯度检查？</a:t>
             </a:r>
             <a:endParaRPr lang="en-US" altLang="zh-CN" dirty="0"/>
           </a:p>
           <a:p>
-            <a:pPr marL="285750" indent="-285750">
-              <a:buFont typeface="Arial" panose="020B0604020202020204" pitchFamily="34" charset="0"/>
-              <a:buChar char="•"/>
-            </a:pPr>
-            <a:r>
-              <a:rPr lang="zh-CN" altLang="en-US" dirty="0"/>
-              <a:t>如何自动化地检查？</a:t>
-            </a:r>
-            <a:endParaRPr lang="en-US" altLang="zh-CN" dirty="0"/>
-          </a:p>
-          <a:p>
-            <a:pPr marL="285750" indent="-285750">
-              <a:buFont typeface="Arial" panose="020B0604020202020204" pitchFamily="34" charset="0"/>
-              <a:buChar char="•"/>
-            </a:pPr>
             <a:endParaRPr lang="en-US" altLang="zh-CN" dirty="0"/>
           </a:p>
           <a:p>
@@ -11834,7 +12377,7 @@
     </p:custDataLst>
     <p:extLst>
       <p:ext uri="{BB962C8B-B14F-4D97-AF65-F5344CB8AC3E}">
-        <p14:creationId xmlns:p14="http://schemas.microsoft.com/office/powerpoint/2010/main" val="11973512"/>
+        <p14:creationId xmlns:p14="http://schemas.microsoft.com/office/powerpoint/2010/main" val="3993699214"/>
       </p:ext>
     </p:extLst>
   </p:cSld>
@@ -11862,7 +12405,7 @@
                             </p:stCondLst>
                             <p:childTnLst>
                               <p:par>
-                                <p:cTn id="5" presetID="1" presetClass="entr" presetSubtype="0" fill="hold" grpId="0" nodeType="clickEffect">
+                                <p:cTn id="5" presetID="1" presetClass="entr" presetSubtype="0" fill="hold" nodeType="clickEffect">
                                   <p:stCondLst>
                                     <p:cond delay="0"/>
                                   </p:stCondLst>
@@ -11875,7 +12418,60 @@
                                           </p:stCondLst>
                                         </p:cTn>
                                         <p:tgtEl>
-                                          <p:spTgt spid="6"/>
+                                          <p:spTgt spid="6">
+                                            <p:txEl>
+                                              <p:pRg st="0" end="0"/>
+                                            </p:txEl>
+                                          </p:spTgt>
+                                        </p:tgtEl>
+                                        <p:attrNameLst>
+                                          <p:attrName>style.visibility</p:attrName>
+                                        </p:attrNameLst>
+                                      </p:cBhvr>
+                                      <p:to>
+                                        <p:strVal val="visible"/>
+                                      </p:to>
+                                    </p:set>
+                                  </p:childTnLst>
+                                </p:cTn>
+                              </p:par>
+                            </p:childTnLst>
+                          </p:cTn>
+                        </p:par>
+                      </p:childTnLst>
+                    </p:cTn>
+                  </p:par>
+                  <p:par>
+                    <p:cTn id="7" fill="hold">
+                      <p:stCondLst>
+                        <p:cond delay="indefinite"/>
+                      </p:stCondLst>
+                      <p:childTnLst>
+                        <p:par>
+                          <p:cTn id="8" fill="hold">
+                            <p:stCondLst>
+                              <p:cond delay="0"/>
+                            </p:stCondLst>
+                            <p:childTnLst>
+                              <p:par>
+                                <p:cTn id="9" presetID="1" presetClass="entr" presetSubtype="0" fill="hold" nodeType="clickEffect">
+                                  <p:stCondLst>
+                                    <p:cond delay="0"/>
+                                  </p:stCondLst>
+                                  <p:childTnLst>
+                                    <p:set>
+                                      <p:cBhvr>
+                                        <p:cTn id="10" dur="1" fill="hold">
+                                          <p:stCondLst>
+                                            <p:cond delay="0"/>
+                                          </p:stCondLst>
+                                        </p:cTn>
+                                        <p:tgtEl>
+                                          <p:spTgt spid="6">
+                                            <p:txEl>
+                                              <p:pRg st="1" end="1"/>
+                                            </p:txEl>
+                                          </p:spTgt>
                                         </p:tgtEl>
                                         <p:attrNameLst>
                                           <p:attrName>style.visibility</p:attrName>
@@ -11915,14 +12511,11 @@
         </p:cTn>
       </p:par>
     </p:tnLst>
-    <p:bldLst>
-      <p:bldP spid="6" grpId="0"/>
-    </p:bldLst>
   </p:timing>
 </p:sld>
 </file>
 
-<file path=ppt/slides/slide22.xml><?xml version="1.0" encoding="utf-8"?>
+<file path=ppt/slides/slide23.xml><?xml version="1.0" encoding="utf-8"?>
 <p:sld xmlns:a="http://schemas.openxmlformats.org/drawingml/2006/main" xmlns:r="http://schemas.openxmlformats.org/officeDocument/2006/relationships" xmlns:p="http://schemas.openxmlformats.org/presentationml/2006/main">
   <p:cSld>
     <p:spTree>
@@ -11992,7 +12585,7 @@
 </p:sld>
 </file>
 
-<file path=ppt/slides/slide23.xml><?xml version="1.0" encoding="utf-8"?>
+<file path=ppt/slides/slide24.xml><?xml version="1.0" encoding="utf-8"?>
 <p:sld xmlns:a="http://schemas.openxmlformats.org/drawingml/2006/main" xmlns:r="http://schemas.openxmlformats.org/officeDocument/2006/relationships" xmlns:p="http://schemas.openxmlformats.org/presentationml/2006/main">
   <p:cSld>
     <p:spTree>
@@ -12415,88 +13008,10 @@
   <p:clrMapOvr>
     <a:masterClrMapping/>
   </p:clrMapOvr>
-  <p:timing>
-    <p:tnLst>
-      <p:par>
-        <p:cTn id="1" dur="indefinite" restart="never" nodeType="tmRoot">
-          <p:childTnLst>
-            <p:seq concurrent="1" nextAc="seek">
-              <p:cTn id="2" dur="indefinite" nodeType="mainSeq">
-                <p:childTnLst>
-                  <p:par>
-                    <p:cTn id="3" fill="hold">
-                      <p:stCondLst>
-                        <p:cond delay="indefinite"/>
-                      </p:stCondLst>
-                      <p:childTnLst>
-                        <p:par>
-                          <p:cTn id="4" fill="hold">
-                            <p:stCondLst>
-                              <p:cond delay="0"/>
-                            </p:stCondLst>
-                            <p:childTnLst>
-                              <p:par>
-                                <p:cTn id="5" presetID="1" presetClass="entr" presetSubtype="0" fill="hold" grpId="0" nodeType="clickEffect">
-                                  <p:stCondLst>
-                                    <p:cond delay="0"/>
-                                  </p:stCondLst>
-                                  <p:childTnLst>
-                                    <p:set>
-                                      <p:cBhvr>
-                                        <p:cTn id="6" dur="1" fill="hold">
-                                          <p:stCondLst>
-                                            <p:cond delay="0"/>
-                                          </p:stCondLst>
-                                        </p:cTn>
-                                        <p:tgtEl>
-                                          <p:spTgt spid="6"/>
-                                        </p:tgtEl>
-                                        <p:attrNameLst>
-                                          <p:attrName>style.visibility</p:attrName>
-                                        </p:attrNameLst>
-                                      </p:cBhvr>
-                                      <p:to>
-                                        <p:strVal val="visible"/>
-                                      </p:to>
-                                    </p:set>
-                                  </p:childTnLst>
-                                </p:cTn>
-                              </p:par>
-                            </p:childTnLst>
-                          </p:cTn>
-                        </p:par>
-                      </p:childTnLst>
-                    </p:cTn>
-                  </p:par>
-                </p:childTnLst>
-              </p:cTn>
-              <p:prevCondLst>
-                <p:cond evt="onPrev" delay="0">
-                  <p:tgtEl>
-                    <p:sldTgt/>
-                  </p:tgtEl>
-                </p:cond>
-              </p:prevCondLst>
-              <p:nextCondLst>
-                <p:cond evt="onNext" delay="0">
-                  <p:tgtEl>
-                    <p:sldTgt/>
-                  </p:tgtEl>
-                </p:cond>
-              </p:nextCondLst>
-            </p:seq>
-          </p:childTnLst>
-        </p:cTn>
-      </p:par>
-    </p:tnLst>
-    <p:bldLst>
-      <p:bldP spid="6" grpId="0"/>
-    </p:bldLst>
-  </p:timing>
 </p:sld>
 </file>
 
-<file path=ppt/slides/slide24.xml><?xml version="1.0" encoding="utf-8"?>
+<file path=ppt/slides/slide25.xml><?xml version="1.0" encoding="utf-8"?>
 <p:sld xmlns:a="http://schemas.openxmlformats.org/drawingml/2006/main" xmlns:r="http://schemas.openxmlformats.org/officeDocument/2006/relationships" xmlns:p="http://schemas.openxmlformats.org/presentationml/2006/main">
   <p:cSld>
     <p:spTree>
@@ -12554,7 +13069,7 @@
 </p:sld>
 </file>
 
-<file path=ppt/slides/slide25.xml><?xml version="1.0" encoding="utf-8"?>
+<file path=ppt/slides/slide26.xml><?xml version="1.0" encoding="utf-8"?>
 <p:sld xmlns:a="http://schemas.openxmlformats.org/drawingml/2006/main" xmlns:r="http://schemas.openxmlformats.org/officeDocument/2006/relationships" xmlns:p="http://schemas.openxmlformats.org/presentationml/2006/main">
   <p:cSld>
     <p:spTree>
@@ -13004,88 +13519,10 @@
   <p:clrMapOvr>
     <a:masterClrMapping/>
   </p:clrMapOvr>
-  <p:timing>
-    <p:tnLst>
-      <p:par>
-        <p:cTn id="1" dur="indefinite" restart="never" nodeType="tmRoot">
-          <p:childTnLst>
-            <p:seq concurrent="1" nextAc="seek">
-              <p:cTn id="2" dur="indefinite" nodeType="mainSeq">
-                <p:childTnLst>
-                  <p:par>
-                    <p:cTn id="3" fill="hold">
-                      <p:stCondLst>
-                        <p:cond delay="indefinite"/>
-                      </p:stCondLst>
-                      <p:childTnLst>
-                        <p:par>
-                          <p:cTn id="4" fill="hold">
-                            <p:stCondLst>
-                              <p:cond delay="0"/>
-                            </p:stCondLst>
-                            <p:childTnLst>
-                              <p:par>
-                                <p:cTn id="5" presetID="1" presetClass="entr" presetSubtype="0" fill="hold" grpId="0" nodeType="clickEffect">
-                                  <p:stCondLst>
-                                    <p:cond delay="0"/>
-                                  </p:stCondLst>
-                                  <p:childTnLst>
-                                    <p:set>
-                                      <p:cBhvr>
-                                        <p:cTn id="6" dur="1" fill="hold">
-                                          <p:stCondLst>
-                                            <p:cond delay="0"/>
-                                          </p:stCondLst>
-                                        </p:cTn>
-                                        <p:tgtEl>
-                                          <p:spTgt spid="6"/>
-                                        </p:tgtEl>
-                                        <p:attrNameLst>
-                                          <p:attrName>style.visibility</p:attrName>
-                                        </p:attrNameLst>
-                                      </p:cBhvr>
-                                      <p:to>
-                                        <p:strVal val="visible"/>
-                                      </p:to>
-                                    </p:set>
-                                  </p:childTnLst>
-                                </p:cTn>
-                              </p:par>
-                            </p:childTnLst>
-                          </p:cTn>
-                        </p:par>
-                      </p:childTnLst>
-                    </p:cTn>
-                  </p:par>
-                </p:childTnLst>
-              </p:cTn>
-              <p:prevCondLst>
-                <p:cond evt="onPrev" delay="0">
-                  <p:tgtEl>
-                    <p:sldTgt/>
-                  </p:tgtEl>
-                </p:cond>
-              </p:prevCondLst>
-              <p:nextCondLst>
-                <p:cond evt="onNext" delay="0">
-                  <p:tgtEl>
-                    <p:sldTgt/>
-                  </p:tgtEl>
-                </p:cond>
-              </p:nextCondLst>
-            </p:seq>
-          </p:childTnLst>
-        </p:cTn>
-      </p:par>
-    </p:tnLst>
-    <p:bldLst>
-      <p:bldP spid="6" grpId="0"/>
-    </p:bldLst>
-  </p:timing>
 </p:sld>
 </file>
 
-<file path=ppt/slides/slide26.xml><?xml version="1.0" encoding="utf-8"?>
+<file path=ppt/slides/slide27.xml><?xml version="1.0" encoding="utf-8"?>
 <p:sld xmlns:a="http://schemas.openxmlformats.org/drawingml/2006/main" xmlns:r="http://schemas.openxmlformats.org/officeDocument/2006/relationships" xmlns:p="http://schemas.openxmlformats.org/presentationml/2006/main">
   <p:cSld>
     <p:spTree>
@@ -13479,88 +13916,10 @@
   <p:clrMapOvr>
     <a:masterClrMapping/>
   </p:clrMapOvr>
-  <p:timing>
-    <p:tnLst>
-      <p:par>
-        <p:cTn id="1" dur="indefinite" restart="never" nodeType="tmRoot">
-          <p:childTnLst>
-            <p:seq concurrent="1" nextAc="seek">
-              <p:cTn id="2" dur="indefinite" nodeType="mainSeq">
-                <p:childTnLst>
-                  <p:par>
-                    <p:cTn id="3" fill="hold">
-                      <p:stCondLst>
-                        <p:cond delay="indefinite"/>
-                      </p:stCondLst>
-                      <p:childTnLst>
-                        <p:par>
-                          <p:cTn id="4" fill="hold">
-                            <p:stCondLst>
-                              <p:cond delay="0"/>
-                            </p:stCondLst>
-                            <p:childTnLst>
-                              <p:par>
-                                <p:cTn id="5" presetID="1" presetClass="entr" presetSubtype="0" fill="hold" grpId="0" nodeType="clickEffect">
-                                  <p:stCondLst>
-                                    <p:cond delay="0"/>
-                                  </p:stCondLst>
-                                  <p:childTnLst>
-                                    <p:set>
-                                      <p:cBhvr>
-                                        <p:cTn id="6" dur="1" fill="hold">
-                                          <p:stCondLst>
-                                            <p:cond delay="0"/>
-                                          </p:stCondLst>
-                                        </p:cTn>
-                                        <p:tgtEl>
-                                          <p:spTgt spid="6"/>
-                                        </p:tgtEl>
-                                        <p:attrNameLst>
-                                          <p:attrName>style.visibility</p:attrName>
-                                        </p:attrNameLst>
-                                      </p:cBhvr>
-                                      <p:to>
-                                        <p:strVal val="visible"/>
-                                      </p:to>
-                                    </p:set>
-                                  </p:childTnLst>
-                                </p:cTn>
-                              </p:par>
-                            </p:childTnLst>
-                          </p:cTn>
-                        </p:par>
-                      </p:childTnLst>
-                    </p:cTn>
-                  </p:par>
-                </p:childTnLst>
-              </p:cTn>
-              <p:prevCondLst>
-                <p:cond evt="onPrev" delay="0">
-                  <p:tgtEl>
-                    <p:sldTgt/>
-                  </p:tgtEl>
-                </p:cond>
-              </p:prevCondLst>
-              <p:nextCondLst>
-                <p:cond evt="onNext" delay="0">
-                  <p:tgtEl>
-                    <p:sldTgt/>
-                  </p:tgtEl>
-                </p:cond>
-              </p:nextCondLst>
-            </p:seq>
-          </p:childTnLst>
-        </p:cTn>
-      </p:par>
-    </p:tnLst>
-    <p:bldLst>
-      <p:bldP spid="6" grpId="0"/>
-    </p:bldLst>
-  </p:timing>
 </p:sld>
 </file>
 
-<file path=ppt/slides/slide27.xml><?xml version="1.0" encoding="utf-8"?>
+<file path=ppt/slides/slide28.xml><?xml version="1.0" encoding="utf-8"?>
 <p:sld xmlns:a="http://schemas.openxmlformats.org/drawingml/2006/main" xmlns:r="http://schemas.openxmlformats.org/officeDocument/2006/relationships" xmlns:p="http://schemas.openxmlformats.org/presentationml/2006/main">
   <p:cSld>
     <p:spTree>
@@ -13610,7 +13969,7 @@
 </p:sld>
 </file>
 
-<file path=ppt/slides/slide28.xml><?xml version="1.0" encoding="utf-8"?>
+<file path=ppt/slides/slide29.xml><?xml version="1.0" encoding="utf-8"?>
 <p:sld xmlns:a="http://schemas.openxmlformats.org/drawingml/2006/main" xmlns:r="http://schemas.openxmlformats.org/officeDocument/2006/relationships" xmlns:p="http://schemas.openxmlformats.org/presentationml/2006/main">
   <p:cSld>
     <p:spTree>
@@ -13782,339 +14141,6 @@
     <p:custDataLst>
       <p:tags r:id="rId1"/>
     </p:custDataLst>
-  </p:cSld>
-  <p:clrMapOvr>
-    <a:masterClrMapping/>
-  </p:clrMapOvr>
-  <p:timing>
-    <p:tnLst>
-      <p:par>
-        <p:cTn id="1" dur="indefinite" restart="never" nodeType="tmRoot">
-          <p:childTnLst>
-            <p:seq concurrent="1" nextAc="seek">
-              <p:cTn id="2" dur="indefinite" nodeType="mainSeq">
-                <p:childTnLst>
-                  <p:par>
-                    <p:cTn id="3" fill="hold">
-                      <p:stCondLst>
-                        <p:cond delay="indefinite"/>
-                      </p:stCondLst>
-                      <p:childTnLst>
-                        <p:par>
-                          <p:cTn id="4" fill="hold">
-                            <p:stCondLst>
-                              <p:cond delay="0"/>
-                            </p:stCondLst>
-                            <p:childTnLst>
-                              <p:par>
-                                <p:cTn id="5" presetID="1" presetClass="entr" presetSubtype="0" fill="hold" grpId="0" nodeType="clickEffect">
-                                  <p:stCondLst>
-                                    <p:cond delay="0"/>
-                                  </p:stCondLst>
-                                  <p:childTnLst>
-                                    <p:set>
-                                      <p:cBhvr>
-                                        <p:cTn id="6" dur="1" fill="hold">
-                                          <p:stCondLst>
-                                            <p:cond delay="0"/>
-                                          </p:stCondLst>
-                                        </p:cTn>
-                                        <p:tgtEl>
-                                          <p:spTgt spid="2">
-                                            <p:txEl>
-                                              <p:pRg st="0" end="0"/>
-                                            </p:txEl>
-                                          </p:spTgt>
-                                        </p:tgtEl>
-                                        <p:attrNameLst>
-                                          <p:attrName>style.visibility</p:attrName>
-                                        </p:attrNameLst>
-                                      </p:cBhvr>
-                                      <p:to>
-                                        <p:strVal val="visible"/>
-                                      </p:to>
-                                    </p:set>
-                                  </p:childTnLst>
-                                </p:cTn>
-                              </p:par>
-                            </p:childTnLst>
-                          </p:cTn>
-                        </p:par>
-                      </p:childTnLst>
-                    </p:cTn>
-                  </p:par>
-                  <p:par>
-                    <p:cTn id="7" fill="hold">
-                      <p:stCondLst>
-                        <p:cond delay="indefinite"/>
-                      </p:stCondLst>
-                      <p:childTnLst>
-                        <p:par>
-                          <p:cTn id="8" fill="hold">
-                            <p:stCondLst>
-                              <p:cond delay="0"/>
-                            </p:stCondLst>
-                            <p:childTnLst>
-                              <p:par>
-                                <p:cTn id="9" presetID="1" presetClass="entr" presetSubtype="0" fill="hold" grpId="0" nodeType="clickEffect">
-                                  <p:stCondLst>
-                                    <p:cond delay="0"/>
-                                  </p:stCondLst>
-                                  <p:childTnLst>
-                                    <p:set>
-                                      <p:cBhvr>
-                                        <p:cTn id="10" dur="1" fill="hold">
-                                          <p:stCondLst>
-                                            <p:cond delay="0"/>
-                                          </p:stCondLst>
-                                        </p:cTn>
-                                        <p:tgtEl>
-                                          <p:spTgt spid="2">
-                                            <p:txEl>
-                                              <p:pRg st="1" end="1"/>
-                                            </p:txEl>
-                                          </p:spTgt>
-                                        </p:tgtEl>
-                                        <p:attrNameLst>
-                                          <p:attrName>style.visibility</p:attrName>
-                                        </p:attrNameLst>
-                                      </p:cBhvr>
-                                      <p:to>
-                                        <p:strVal val="visible"/>
-                                      </p:to>
-                                    </p:set>
-                                  </p:childTnLst>
-                                </p:cTn>
-                              </p:par>
-                            </p:childTnLst>
-                          </p:cTn>
-                        </p:par>
-                      </p:childTnLst>
-                    </p:cTn>
-                  </p:par>
-                </p:childTnLst>
-              </p:cTn>
-              <p:prevCondLst>
-                <p:cond evt="onPrev" delay="0">
-                  <p:tgtEl>
-                    <p:sldTgt/>
-                  </p:tgtEl>
-                </p:cond>
-              </p:prevCondLst>
-              <p:nextCondLst>
-                <p:cond evt="onNext" delay="0">
-                  <p:tgtEl>
-                    <p:sldTgt/>
-                  </p:tgtEl>
-                </p:cond>
-              </p:nextCondLst>
-            </p:seq>
-          </p:childTnLst>
-        </p:cTn>
-      </p:par>
-    </p:tnLst>
-    <p:bldLst>
-      <p:bldP spid="2" grpId="0" uiExpand="1" build="p"/>
-    </p:bldLst>
-  </p:timing>
-</p:sld>
-</file>
-
-<file path=ppt/slides/slide29.xml><?xml version="1.0" encoding="utf-8"?>
-<p:sld xmlns:a="http://schemas.openxmlformats.org/drawingml/2006/main" xmlns:r="http://schemas.openxmlformats.org/officeDocument/2006/relationships" xmlns:p="http://schemas.openxmlformats.org/presentationml/2006/main">
-  <p:cSld>
-    <p:spTree>
-      <p:nvGrpSpPr>
-        <p:cNvPr id="1" name=""/>
-        <p:cNvGrpSpPr/>
-        <p:nvPr/>
-      </p:nvGrpSpPr>
-      <p:grpSpPr>
-        <a:xfrm>
-          <a:off x="0" y="0"/>
-          <a:ext cx="0" cy="0"/>
-          <a:chOff x="0" y="0"/>
-          <a:chExt cx="0" cy="0"/>
-        </a:xfrm>
-      </p:grpSpPr>
-      <p:sp>
-        <p:nvSpPr>
-          <p:cNvPr id="2" name="文本占位符 1"/>
-          <p:cNvSpPr>
-            <a:spLocks noGrp="1"/>
-          </p:cNvSpPr>
-          <p:nvPr>
-            <p:ph type="body" idx="1"/>
-          </p:nvPr>
-        </p:nvSpPr>
-        <p:spPr/>
-        <p:txBody>
-          <a:bodyPr/>
-          <a:lstStyle/>
-          <a:p>
-            <a:pPr marL="285750" indent="-285750">
-              <a:buFont typeface="Arial" panose="020B0604020202020204" pitchFamily="34" charset="0"/>
-              <a:buChar char="•"/>
-            </a:pPr>
-            <a:r>
-              <a:rPr lang="zh-CN" altLang="en-US" dirty="0">
-                <a:sym typeface="+mn-ea"/>
-                <a:hlinkClick r:id="rId3"/>
-              </a:rPr>
-              <a:t>零基础入门深度学习 </a:t>
-            </a:r>
-            <a:r>
-              <a:rPr lang="en-US" altLang="zh-CN" dirty="0">
-                <a:sym typeface="+mn-ea"/>
-                <a:hlinkClick r:id="rId3"/>
-              </a:rPr>
-              <a:t>| </a:t>
-            </a:r>
-            <a:r>
-              <a:rPr lang="zh-CN" altLang="en-US" dirty="0">
-                <a:sym typeface="+mn-ea"/>
-                <a:hlinkClick r:id="rId3"/>
-              </a:rPr>
-              <a:t>第三章：神经网络和反向传播算法</a:t>
-            </a:r>
-            <a:endParaRPr lang="en-US" altLang="zh-CN" dirty="0">
-              <a:sym typeface="+mn-ea"/>
-            </a:endParaRPr>
-          </a:p>
-          <a:p>
-            <a:pPr marL="285750" indent="-285750">
-              <a:buFont typeface="Arial" panose="020B0604020202020204" pitchFamily="34" charset="0"/>
-              <a:buChar char="•"/>
-            </a:pPr>
-            <a:r>
-              <a:rPr lang="zh-CN" altLang="en-US" dirty="0">
-                <a:sym typeface="+mn-ea"/>
-                <a:hlinkClick r:id="rId4"/>
-              </a:rPr>
-              <a:t>机器学习笔记：训练集、验证集和测试集区别</a:t>
-            </a:r>
-            <a:endParaRPr lang="en-US" altLang="zh-CN" dirty="0">
-              <a:sym typeface="+mn-ea"/>
-            </a:endParaRPr>
-          </a:p>
-          <a:p>
-            <a:pPr marL="285750" indent="-285750">
-              <a:buFont typeface="Arial" panose="020B0604020202020204" pitchFamily="34" charset="0"/>
-              <a:buChar char="•"/>
-            </a:pPr>
-            <a:r>
-              <a:rPr lang="zh-CN" altLang="en-US" dirty="0">
-                <a:sym typeface="+mn-ea"/>
-                <a:hlinkClick r:id="rId5"/>
-              </a:rPr>
-              <a:t>数据集</a:t>
-            </a:r>
-            <a:r>
-              <a:rPr lang="en" dirty="0">
-                <a:sym typeface="+mn-ea"/>
-                <a:hlinkClick r:id="rId5"/>
-              </a:rPr>
-              <a:t>shuffle</a:t>
-            </a:r>
-            <a:r>
-              <a:rPr lang="zh-CN" altLang="en-US" dirty="0">
-                <a:sym typeface="+mn-ea"/>
-                <a:hlinkClick r:id="rId5"/>
-              </a:rPr>
-              <a:t>的重要性</a:t>
-            </a:r>
-            <a:endParaRPr dirty="0">
-              <a:sym typeface="+mn-ea"/>
-            </a:endParaRPr>
-          </a:p>
-        </p:txBody>
-      </p:sp>
-      <p:sp>
-        <p:nvSpPr>
-          <p:cNvPr id="3" name="标题 2"/>
-          <p:cNvSpPr>
-            <a:spLocks noGrp="1"/>
-          </p:cNvSpPr>
-          <p:nvPr>
-            <p:ph type="title"/>
-          </p:nvPr>
-        </p:nvSpPr>
-        <p:spPr/>
-        <p:txBody>
-          <a:bodyPr/>
-          <a:lstStyle/>
-          <a:p>
-            <a:r>
-              <a:rPr lang="zh-CN" altLang="en-US" dirty="0"/>
-              <a:t>参考资料</a:t>
-            </a:r>
-          </a:p>
-        </p:txBody>
-      </p:sp>
-      <p:graphicFrame>
-        <p:nvGraphicFramePr>
-          <p:cNvPr id="4" name="对象 3">
-            <a:hlinkClick r:id="" action="ppaction://ole?verb=0"/>
-          </p:cNvPr>
-          <p:cNvGraphicFramePr>
-            <a:graphicFrameLocks noChangeAspect="1"/>
-          </p:cNvGraphicFramePr>
-          <p:nvPr/>
-        </p:nvGraphicFramePr>
-        <p:xfrm>
-          <a:off x="5638800" y="3244850"/>
-          <a:ext cx="914400" cy="368300"/>
-        </p:xfrm>
-        <a:graphic>
-          <a:graphicData uri="http://schemas.openxmlformats.org/presentationml/2006/ole">
-            <mc:AlternateContent xmlns:mc="http://schemas.openxmlformats.org/markup-compatibility/2006">
-              <mc:Choice xmlns:v="urn:schemas-microsoft-com:vml" Requires="v">
-                <p:oleObj r:id="rId6" imgW="914400" imgH="368300" progId="Equation.KSEE3">
-                  <p:embed/>
-                </p:oleObj>
-              </mc:Choice>
-              <mc:Fallback>
-                <p:oleObj r:id="rId6" imgW="914400" imgH="368300" progId="Equation.KSEE3">
-                  <p:embed/>
-                  <p:pic>
-                    <p:nvPicPr>
-                      <p:cNvPr id="4" name="对象 3">
-                        <a:hlinkClick r:id="" action="ppaction://ole?verb=0"/>
-                      </p:cNvPr>
-                      <p:cNvPicPr/>
-                      <p:nvPr/>
-                    </p:nvPicPr>
-                    <p:blipFill>
-                      <a:blip r:embed="rId7"/>
-                      <a:stretch>
-                        <a:fillRect/>
-                      </a:stretch>
-                    </p:blipFill>
-                    <p:spPr>
-                      <a:xfrm>
-                        <a:off x="5638800" y="3244850"/>
-                        <a:ext cx="914400" cy="368300"/>
-                      </a:xfrm>
-                      <a:prstGeom prst="rect">
-                        <a:avLst/>
-                      </a:prstGeom>
-                    </p:spPr>
-                  </p:pic>
-                </p:oleObj>
-              </mc:Fallback>
-            </mc:AlternateContent>
-          </a:graphicData>
-        </a:graphic>
-      </p:graphicFrame>
-    </p:spTree>
-    <p:custDataLst>
-      <p:tags r:id="rId1"/>
-    </p:custDataLst>
-    <p:extLst>
-      <p:ext uri="{BB962C8B-B14F-4D97-AF65-F5344CB8AC3E}">
-        <p14:creationId xmlns:p14="http://schemas.microsoft.com/office/powerpoint/2010/main" val="2517994622"/>
-      </p:ext>
-    </p:extLst>
   </p:cSld>
   <p:clrMapOvr>
     <a:masterClrMapping/>
@@ -14684,6 +14710,73 @@
               <a:buFont typeface="Arial" panose="020B0604020202020204" pitchFamily="34" charset="0"/>
               <a:buChar char="•"/>
             </a:pPr>
+            <a:r>
+              <a:rPr lang="zh-CN" altLang="en-US" dirty="0">
+                <a:sym typeface="+mn-ea"/>
+                <a:hlinkClick r:id="rId3"/>
+              </a:rPr>
+              <a:t>零基础入门深度学习 </a:t>
+            </a:r>
+            <a:r>
+              <a:rPr lang="en-US" altLang="zh-CN" dirty="0">
+                <a:sym typeface="+mn-ea"/>
+                <a:hlinkClick r:id="rId3"/>
+              </a:rPr>
+              <a:t>| </a:t>
+            </a:r>
+            <a:r>
+              <a:rPr lang="zh-CN" altLang="en-US" dirty="0">
+                <a:sym typeface="+mn-ea"/>
+                <a:hlinkClick r:id="rId3"/>
+              </a:rPr>
+              <a:t>第三章：神经网络和反向传播算法</a:t>
+            </a:r>
+            <a:endParaRPr lang="en-US" altLang="zh-CN" dirty="0">
+              <a:sym typeface="+mn-ea"/>
+            </a:endParaRPr>
+          </a:p>
+          <a:p>
+            <a:pPr marL="285750" indent="-285750">
+              <a:buFont typeface="Arial" panose="020B0604020202020204" pitchFamily="34" charset="0"/>
+              <a:buChar char="•"/>
+            </a:pPr>
+            <a:r>
+              <a:rPr lang="zh-CN" altLang="en-US" dirty="0">
+                <a:sym typeface="+mn-ea"/>
+                <a:hlinkClick r:id="rId4"/>
+              </a:rPr>
+              <a:t>机器学习笔记：训练集、验证集和测试集区别</a:t>
+            </a:r>
+            <a:endParaRPr lang="en-US" altLang="zh-CN" dirty="0">
+              <a:sym typeface="+mn-ea"/>
+            </a:endParaRPr>
+          </a:p>
+          <a:p>
+            <a:pPr marL="285750" indent="-285750">
+              <a:buFont typeface="Arial" panose="020B0604020202020204" pitchFamily="34" charset="0"/>
+              <a:buChar char="•"/>
+            </a:pPr>
+            <a:r>
+              <a:rPr lang="zh-CN" altLang="en-US" dirty="0">
+                <a:sym typeface="+mn-ea"/>
+                <a:hlinkClick r:id="rId5"/>
+              </a:rPr>
+              <a:t>数据集</a:t>
+            </a:r>
+            <a:r>
+              <a:rPr lang="en" dirty="0">
+                <a:sym typeface="+mn-ea"/>
+                <a:hlinkClick r:id="rId5"/>
+              </a:rPr>
+              <a:t>shuffle</a:t>
+            </a:r>
+            <a:r>
+              <a:rPr lang="zh-CN" altLang="en-US" dirty="0">
+                <a:sym typeface="+mn-ea"/>
+                <a:hlinkClick r:id="rId5"/>
+              </a:rPr>
+              <a:t>的重要性</a:t>
+            </a:r>
             <a:endParaRPr dirty="0">
               <a:sym typeface="+mn-ea"/>
             </a:endParaRPr>
@@ -14706,19 +14799,74 @@
           <a:lstStyle/>
           <a:p>
             <a:r>
-              <a:rPr lang="zh-CN" altLang="en-US"/>
-              <a:t>下节课预告</a:t>
+              <a:rPr lang="zh-CN" altLang="en-US" dirty="0"/>
+              <a:t>参考资料</a:t>
             </a:r>
           </a:p>
         </p:txBody>
       </p:sp>
+      <p:graphicFrame>
+        <p:nvGraphicFramePr>
+          <p:cNvPr id="4" name="对象 3">
+            <a:hlinkClick r:id="" action="ppaction://ole?verb=0"/>
+          </p:cNvPr>
+          <p:cNvGraphicFramePr>
+            <a:graphicFrameLocks noChangeAspect="1"/>
+          </p:cNvGraphicFramePr>
+          <p:nvPr/>
+        </p:nvGraphicFramePr>
+        <p:xfrm>
+          <a:off x="5638800" y="3244850"/>
+          <a:ext cx="914400" cy="368300"/>
+        </p:xfrm>
+        <a:graphic>
+          <a:graphicData uri="http://schemas.openxmlformats.org/presentationml/2006/ole">
+            <mc:AlternateContent xmlns:mc="http://schemas.openxmlformats.org/markup-compatibility/2006">
+              <mc:Choice xmlns:v="urn:schemas-microsoft-com:vml" Requires="v">
+                <p:oleObj r:id="rId6" imgW="914400" imgH="368300" progId="Equation.KSEE3">
+                  <p:embed/>
+                </p:oleObj>
+              </mc:Choice>
+              <mc:Fallback>
+                <p:oleObj r:id="rId6" imgW="914400" imgH="368300" progId="Equation.KSEE3">
+                  <p:embed/>
+                  <p:pic>
+                    <p:nvPicPr>
+                      <p:cNvPr id="4" name="对象 3">
+                        <a:hlinkClick r:id="" action="ppaction://ole?verb=0"/>
+                      </p:cNvPr>
+                      <p:cNvPicPr/>
+                      <p:nvPr/>
+                    </p:nvPicPr>
+                    <p:blipFill>
+                      <a:blip r:embed="rId7"/>
+                      <a:stretch>
+                        <a:fillRect/>
+                      </a:stretch>
+                    </p:blipFill>
+                    <p:spPr>
+                      <a:xfrm>
+                        <a:off x="5638800" y="3244850"/>
+                        <a:ext cx="914400" cy="368300"/>
+                      </a:xfrm>
+                      <a:prstGeom prst="rect">
+                        <a:avLst/>
+                      </a:prstGeom>
+                    </p:spPr>
+                  </p:pic>
+                </p:oleObj>
+              </mc:Fallback>
+            </mc:AlternateContent>
+          </a:graphicData>
+        </a:graphic>
+      </p:graphicFrame>
     </p:spTree>
     <p:custDataLst>
       <p:tags r:id="rId1"/>
     </p:custDataLst>
     <p:extLst>
       <p:ext uri="{BB962C8B-B14F-4D97-AF65-F5344CB8AC3E}">
-        <p14:creationId xmlns:p14="http://schemas.microsoft.com/office/powerpoint/2010/main" val="1027050507"/>
+        <p14:creationId xmlns:p14="http://schemas.microsoft.com/office/powerpoint/2010/main" val="2517994622"/>
       </p:ext>
     </p:extLst>
   </p:cSld>
@@ -14729,34 +14877,6 @@
 </file>
 
 <file path=ppt/slides/slide31.xml><?xml version="1.0" encoding="utf-8"?>
-<p:sld xmlns:a="http://schemas.openxmlformats.org/drawingml/2006/main" xmlns:r="http://schemas.openxmlformats.org/officeDocument/2006/relationships" xmlns:p="http://schemas.openxmlformats.org/presentationml/2006/main">
-  <p:cSld>
-    <p:spTree>
-      <p:nvGrpSpPr>
-        <p:cNvPr id="1" name=""/>
-        <p:cNvGrpSpPr/>
-        <p:nvPr/>
-      </p:nvGrpSpPr>
-      <p:grpSpPr>
-        <a:xfrm>
-          <a:off x="0" y="0"/>
-          <a:ext cx="0" cy="0"/>
-          <a:chOff x="0" y="0"/>
-          <a:chExt cx="0" cy="0"/>
-        </a:xfrm>
-      </p:grpSpPr>
-    </p:spTree>
-    <p:custDataLst>
-      <p:tags r:id="rId1"/>
-    </p:custDataLst>
-  </p:cSld>
-  <p:clrMapOvr>
-    <a:masterClrMapping/>
-  </p:clrMapOvr>
-</p:sld>
-</file>
-
-<file path=ppt/slides/slide32.xml><?xml version="1.0" encoding="utf-8"?>
 <p:sld xmlns:a="http://schemas.openxmlformats.org/drawingml/2006/main" xmlns:r="http://schemas.openxmlformats.org/officeDocument/2006/relationships" xmlns:p="http://schemas.openxmlformats.org/presentationml/2006/main">
   <p:cSld>
     <p:spTree>
@@ -14792,7 +14912,9 @@
               <a:buFont typeface="Arial" panose="020B0604020202020204" pitchFamily="34" charset="0"/>
               <a:buChar char="•"/>
             </a:pPr>
-            <a:endParaRPr lang="en-US" altLang="zh-CN" dirty="0"/>
+            <a:endParaRPr dirty="0">
+              <a:sym typeface="+mn-ea"/>
+            </a:endParaRPr>
           </a:p>
         </p:txBody>
       </p:sp>
@@ -14812,6 +14934,112 @@
           <a:lstStyle/>
           <a:p>
             <a:r>
+              <a:rPr lang="zh-CN" altLang="en-US"/>
+              <a:t>下节课预告</a:t>
+            </a:r>
+          </a:p>
+        </p:txBody>
+      </p:sp>
+    </p:spTree>
+    <p:custDataLst>
+      <p:tags r:id="rId1"/>
+    </p:custDataLst>
+    <p:extLst>
+      <p:ext uri="{BB962C8B-B14F-4D97-AF65-F5344CB8AC3E}">
+        <p14:creationId xmlns:p14="http://schemas.microsoft.com/office/powerpoint/2010/main" val="1027050507"/>
+      </p:ext>
+    </p:extLst>
+  </p:cSld>
+  <p:clrMapOvr>
+    <a:masterClrMapping/>
+  </p:clrMapOvr>
+</p:sld>
+</file>
+
+<file path=ppt/slides/slide32.xml><?xml version="1.0" encoding="utf-8"?>
+<p:sld xmlns:a="http://schemas.openxmlformats.org/drawingml/2006/main" xmlns:r="http://schemas.openxmlformats.org/officeDocument/2006/relationships" xmlns:p="http://schemas.openxmlformats.org/presentationml/2006/main">
+  <p:cSld>
+    <p:spTree>
+      <p:nvGrpSpPr>
+        <p:cNvPr id="1" name=""/>
+        <p:cNvGrpSpPr/>
+        <p:nvPr/>
+      </p:nvGrpSpPr>
+      <p:grpSpPr>
+        <a:xfrm>
+          <a:off x="0" y="0"/>
+          <a:ext cx="0" cy="0"/>
+          <a:chOff x="0" y="0"/>
+          <a:chExt cx="0" cy="0"/>
+        </a:xfrm>
+      </p:grpSpPr>
+    </p:spTree>
+    <p:custDataLst>
+      <p:tags r:id="rId1"/>
+    </p:custDataLst>
+  </p:cSld>
+  <p:clrMapOvr>
+    <a:masterClrMapping/>
+  </p:clrMapOvr>
+</p:sld>
+</file>
+
+<file path=ppt/slides/slide33.xml><?xml version="1.0" encoding="utf-8"?>
+<p:sld xmlns:a="http://schemas.openxmlformats.org/drawingml/2006/main" xmlns:r="http://schemas.openxmlformats.org/officeDocument/2006/relationships" xmlns:p="http://schemas.openxmlformats.org/presentationml/2006/main">
+  <p:cSld>
+    <p:spTree>
+      <p:nvGrpSpPr>
+        <p:cNvPr id="1" name=""/>
+        <p:cNvGrpSpPr/>
+        <p:nvPr/>
+      </p:nvGrpSpPr>
+      <p:grpSpPr>
+        <a:xfrm>
+          <a:off x="0" y="0"/>
+          <a:ext cx="0" cy="0"/>
+          <a:chOff x="0" y="0"/>
+          <a:chExt cx="0" cy="0"/>
+        </a:xfrm>
+      </p:grpSpPr>
+      <p:sp>
+        <p:nvSpPr>
+          <p:cNvPr id="2" name="文本占位符 1"/>
+          <p:cNvSpPr>
+            <a:spLocks noGrp="1"/>
+          </p:cNvSpPr>
+          <p:nvPr>
+            <p:ph type="body" idx="1"/>
+          </p:nvPr>
+        </p:nvSpPr>
+        <p:spPr/>
+        <p:txBody>
+          <a:bodyPr/>
+          <a:lstStyle/>
+          <a:p>
+            <a:pPr marL="285750" indent="-285750">
+              <a:buFont typeface="Arial" panose="020B0604020202020204" pitchFamily="34" charset="0"/>
+              <a:buChar char="•"/>
+            </a:pPr>
+            <a:endParaRPr lang="en-US" altLang="zh-CN" dirty="0"/>
+          </a:p>
+        </p:txBody>
+      </p:sp>
+      <p:sp>
+        <p:nvSpPr>
+          <p:cNvPr id="3" name="标题 2"/>
+          <p:cNvSpPr>
+            <a:spLocks noGrp="1"/>
+          </p:cNvSpPr>
+          <p:nvPr>
+            <p:ph type="title"/>
+          </p:nvPr>
+        </p:nvSpPr>
+        <p:spPr/>
+        <p:txBody>
+          <a:bodyPr/>
+          <a:lstStyle/>
+          <a:p>
+            <a:r>
               <a:rPr lang="zh-CN" altLang="en-US" dirty="0"/>
               <a:t>问答</a:t>
             </a:r>
@@ -14829,7 +15057,7 @@
 </p:sld>
 </file>
 
-<file path=ppt/slides/slide33.xml><?xml version="1.0" encoding="utf-8"?>
+<file path=ppt/slides/slide34.xml><?xml version="1.0" encoding="utf-8"?>
 <p:sld xmlns:a="http://schemas.openxmlformats.org/drawingml/2006/main" xmlns:r="http://schemas.openxmlformats.org/officeDocument/2006/relationships" xmlns:p="http://schemas.openxmlformats.org/presentationml/2006/main">
   <p:cSld>
     <p:spTree>
@@ -17563,6 +17791,15 @@
 </file>
 
 <file path=ppt/tags/tag102.xml><?xml version="1.0" encoding="utf-8"?>
+<p:tagLst xmlns:a="http://schemas.openxmlformats.org/drawingml/2006/main" xmlns:r="http://schemas.openxmlformats.org/officeDocument/2006/relationships" xmlns:p="http://schemas.openxmlformats.org/presentationml/2006/main">
+  <p:tag name="KSO_WM_BEAUTIFY_FLAG" val="#wm#"/>
+  <p:tag name="KSO_WM_TEMPLATE_CATEGORY" val="custom"/>
+  <p:tag name="KSO_WM_TEMPLATE_INDEX" val="20187308"/>
+  <p:tag name="KSO_WM_SPECIAL_SOURCE" val="bdnull"/>
+</p:tagLst>
+</file>
+
+<file path=ppt/tags/tag103.xml><?xml version="1.0" encoding="utf-8"?>
 <p:tagLst xmlns:a="http://schemas.openxmlformats.org/drawingml/2006/main" xmlns:r="http://schemas.openxmlformats.org/officeDocument/2006/relationships" xmlns:p="http://schemas.openxmlformats.org/presentationml/2006/main">
   <p:tag name="KSO_WM_BEAUTIFY_FLAG" val="#wm#"/>
   <p:tag name="KSO_WM_TEMPLATE_CATEGORY" val="custom"/>

</xml_diff>

<commit_message>
feat(5_handwriting_by_linear_layer): update code and ppt
</commit_message>
<xml_diff>
--- a/lessons/5_handwriting_by_linear_layer/ppt/用全连接层识别手写数字.pptx
+++ b/lessons/5_handwriting_by_linear_layer/ppt/用全连接层识别手写数字.pptx
@@ -13573,7 +13573,15 @@
             </a:pPr>
             <a:r>
               <a:rPr lang="zh-CN" altLang="en-US" dirty="0"/>
-              <a:t>请每个同学都运行代码，查看正确率收敛了吗？</a:t>
+              <a:t>请每个同学都运行代码，查看推理正确率是否接近</a:t>
+            </a:r>
+            <a:r>
+              <a:rPr lang="en-US" altLang="zh-CN"/>
+              <a:t>100%</a:t>
+            </a:r>
+            <a:r>
+              <a:rPr lang="zh-CN" altLang="en-US"/>
+              <a:t>？</a:t>
             </a:r>
             <a:endParaRPr lang="en-US" altLang="zh-CN" dirty="0"/>
           </a:p>

</xml_diff>